<commit_message>
update live power bi dashboard
</commit_message>
<xml_diff>
--- a/NHS NECSU.pptx
+++ b/NHS NECSU.pptx
@@ -4,13 +4,17 @@
   <p:sldMasterIdLst>
     <p:sldMasterId id="2147483648" r:id="rId1"/>
   </p:sldMasterIdLst>
+  <p:notesMasterIdLst>
+    <p:notesMasterId r:id="rId9"/>
+  </p:notesMasterIdLst>
   <p:sldIdLst>
     <p:sldId id="256" r:id="rId2"/>
     <p:sldId id="261" r:id="rId3"/>
     <p:sldId id="262" r:id="rId4"/>
     <p:sldId id="266" r:id="rId5"/>
     <p:sldId id="263" r:id="rId6"/>
-    <p:sldId id="264" r:id="rId7"/>
+    <p:sldId id="267" r:id="rId7"/>
+    <p:sldId id="264" r:id="rId8"/>
   </p:sldIdLst>
   <p:sldSz cx="12192000" cy="6858000"/>
   <p:notesSz cx="6858000" cy="9144000"/>
@@ -120,7 +124,7 @@
 <file path=ppt/revisionInfo.xml><?xml version="1.0" encoding="utf-8"?>
 <p1510:revInfo xmlns:a="http://schemas.openxmlformats.org/drawingml/2006/main" xmlns:r="http://schemas.openxmlformats.org/officeDocument/2006/relationships" xmlns:p1510="http://schemas.microsoft.com/office/powerpoint/2015/10/main">
   <p1510:revLst>
-    <p1510:client id="{482898C6-496C-4C8F-BAA0-F3E4D74886C1}" v="11" dt="2024-03-09T02:36:36.198"/>
+    <p1510:client id="{A6E9FDDE-35B1-41D0-9486-809A7D6ED56F}" v="24" dt="2024-06-04T00:29:48.966"/>
   </p1510:revLst>
 </p1510:revInfo>
 </file>
@@ -231,7 +235,7 @@
   <pc:docChgLst>
     <pc:chgData name="Adebo Dolapo" userId="12682232566d0c09" providerId="LiveId" clId="{482898C6-496C-4C8F-BAA0-F3E4D74886C1}"/>
     <pc:docChg chg="custSel addSld delSld modSld">
-      <pc:chgData name="Adebo Dolapo" userId="12682232566d0c09" providerId="LiveId" clId="{482898C6-496C-4C8F-BAA0-F3E4D74886C1}" dt="2024-03-09T02:36:39.416" v="18" actId="47"/>
+      <pc:chgData name="Adebo Dolapo" userId="12682232566d0c09" providerId="LiveId" clId="{482898C6-496C-4C8F-BAA0-F3E4D74886C1}" dt="2024-03-11T22:12:52.336" v="22"/>
       <pc:docMkLst>
         <pc:docMk/>
       </pc:docMkLst>
@@ -319,9 +323,544 @@
           </ac:graphicFrameMkLst>
         </pc:graphicFrameChg>
       </pc:sldChg>
+      <pc:sldChg chg="addSp delSp new mod">
+        <pc:chgData name="Adebo Dolapo" userId="12682232566d0c09" providerId="LiveId" clId="{482898C6-496C-4C8F-BAA0-F3E4D74886C1}" dt="2024-03-11T22:12:52.336" v="22"/>
+        <pc:sldMkLst>
+          <pc:docMk/>
+          <pc:sldMk cId="1521618409" sldId="267"/>
+        </pc:sldMkLst>
+        <pc:spChg chg="del">
+          <ac:chgData name="Adebo Dolapo" userId="12682232566d0c09" providerId="LiveId" clId="{482898C6-496C-4C8F-BAA0-F3E4D74886C1}" dt="2024-03-11T22:12:45.021" v="20" actId="478"/>
+          <ac:spMkLst>
+            <pc:docMk/>
+            <pc:sldMk cId="1521618409" sldId="267"/>
+            <ac:spMk id="2" creationId="{DEBEA51B-9C34-928E-5B41-FA7602FCA901}"/>
+          </ac:spMkLst>
+        </pc:spChg>
+        <pc:spChg chg="del">
+          <ac:chgData name="Adebo Dolapo" userId="12682232566d0c09" providerId="LiveId" clId="{482898C6-496C-4C8F-BAA0-F3E4D74886C1}" dt="2024-03-11T22:12:47.919" v="21" actId="478"/>
+          <ac:spMkLst>
+            <pc:docMk/>
+            <pc:sldMk cId="1521618409" sldId="267"/>
+            <ac:spMk id="3" creationId="{C2EAF1BA-6BAA-4A1B-EA51-6FBB22A0E9A7}"/>
+          </ac:spMkLst>
+        </pc:spChg>
+        <pc:graphicFrameChg chg="add">
+          <ac:chgData name="Adebo Dolapo" userId="12682232566d0c09" providerId="LiveId" clId="{482898C6-496C-4C8F-BAA0-F3E4D74886C1}" dt="2024-03-11T22:12:52.336" v="22"/>
+          <ac:graphicFrameMkLst>
+            <pc:docMk/>
+            <pc:sldMk cId="1521618409" sldId="267"/>
+            <ac:graphicFrameMk id="4" creationId="{F6AF5423-F83E-0BEC-EEF5-DFF065A0C6F1}"/>
+          </ac:graphicFrameMkLst>
+        </pc:graphicFrameChg>
+      </pc:sldChg>
+    </pc:docChg>
+  </pc:docChgLst>
+  <pc:docChgLst>
+    <pc:chgData name="Adebo Dolapo" userId="12682232566d0c09" providerId="LiveId" clId="{A6E9FDDE-35B1-41D0-9486-809A7D6ED56F}"/>
+    <pc:docChg chg="custSel modSld">
+      <pc:chgData name="Adebo Dolapo" userId="12682232566d0c09" providerId="LiveId" clId="{A6E9FDDE-35B1-41D0-9486-809A7D6ED56F}" dt="2024-06-04T00:28:41.456" v="20" actId="478"/>
+      <pc:docMkLst>
+        <pc:docMk/>
+      </pc:docMkLst>
+      <pc:sldChg chg="addSp delSp modSp mod">
+        <pc:chgData name="Adebo Dolapo" userId="12682232566d0c09" providerId="LiveId" clId="{A6E9FDDE-35B1-41D0-9486-809A7D6ED56F}" dt="2024-06-04T00:28:41.456" v="20" actId="478"/>
+        <pc:sldMkLst>
+          <pc:docMk/>
+          <pc:sldMk cId="4092566943" sldId="261"/>
+        </pc:sldMkLst>
+        <pc:graphicFrameChg chg="add mod">
+          <ac:chgData name="Adebo Dolapo" userId="12682232566d0c09" providerId="LiveId" clId="{A6E9FDDE-35B1-41D0-9486-809A7D6ED56F}" dt="2024-06-04T00:24:04.082" v="3" actId="14100"/>
+          <ac:graphicFrameMkLst>
+            <pc:docMk/>
+            <pc:sldMk cId="4092566943" sldId="261"/>
+            <ac:graphicFrameMk id="3" creationId="{F56E645C-F9BF-25D2-1E5E-05B4D6D99814}"/>
+          </ac:graphicFrameMkLst>
+        </pc:graphicFrameChg>
+        <pc:graphicFrameChg chg="add del mod">
+          <ac:chgData name="Adebo Dolapo" userId="12682232566d0c09" providerId="LiveId" clId="{A6E9FDDE-35B1-41D0-9486-809A7D6ED56F}" dt="2024-06-04T00:28:41.456" v="20" actId="478"/>
+          <ac:graphicFrameMkLst>
+            <pc:docMk/>
+            <pc:sldMk cId="4092566943" sldId="261"/>
+            <ac:graphicFrameMk id="4" creationId="{82FF1C1D-00C5-E249-32B1-446C01AE82A0}"/>
+          </ac:graphicFrameMkLst>
+        </pc:graphicFrameChg>
+      </pc:sldChg>
+      <pc:sldChg chg="addSp modSp mod">
+        <pc:chgData name="Adebo Dolapo" userId="12682232566d0c09" providerId="LiveId" clId="{A6E9FDDE-35B1-41D0-9486-809A7D6ED56F}" dt="2024-06-04T00:25:06.534" v="6" actId="14100"/>
+        <pc:sldMkLst>
+          <pc:docMk/>
+          <pc:sldMk cId="218643481" sldId="262"/>
+        </pc:sldMkLst>
+        <pc:graphicFrameChg chg="add mod">
+          <ac:chgData name="Adebo Dolapo" userId="12682232566d0c09" providerId="LiveId" clId="{A6E9FDDE-35B1-41D0-9486-809A7D6ED56F}" dt="2024-06-04T00:25:06.534" v="6" actId="14100"/>
+          <ac:graphicFrameMkLst>
+            <pc:docMk/>
+            <pc:sldMk cId="218643481" sldId="262"/>
+            <ac:graphicFrameMk id="3" creationId="{8AA0450F-3BF0-C2D5-0124-895E728E6DF0}"/>
+          </ac:graphicFrameMkLst>
+        </pc:graphicFrameChg>
+      </pc:sldChg>
+      <pc:sldChg chg="addSp delSp modSp mod">
+        <pc:chgData name="Adebo Dolapo" userId="12682232566d0c09" providerId="LiveId" clId="{A6E9FDDE-35B1-41D0-9486-809A7D6ED56F}" dt="2024-06-04T00:27:04.766" v="16" actId="14100"/>
+        <pc:sldMkLst>
+          <pc:docMk/>
+          <pc:sldMk cId="3943863941" sldId="266"/>
+        </pc:sldMkLst>
+        <pc:graphicFrameChg chg="add del mod">
+          <ac:chgData name="Adebo Dolapo" userId="12682232566d0c09" providerId="LiveId" clId="{A6E9FDDE-35B1-41D0-9486-809A7D6ED56F}" dt="2024-06-04T00:26:50.234" v="14" actId="478"/>
+          <ac:graphicFrameMkLst>
+            <pc:docMk/>
+            <pc:sldMk cId="3943863941" sldId="266"/>
+            <ac:graphicFrameMk id="2" creationId="{58C502D3-F2AB-D861-715A-6DE6CA0A01B5}"/>
+          </ac:graphicFrameMkLst>
+        </pc:graphicFrameChg>
+        <pc:graphicFrameChg chg="add mod">
+          <ac:chgData name="Adebo Dolapo" userId="12682232566d0c09" providerId="LiveId" clId="{A6E9FDDE-35B1-41D0-9486-809A7D6ED56F}" dt="2024-06-04T00:27:04.766" v="16" actId="14100"/>
+          <ac:graphicFrameMkLst>
+            <pc:docMk/>
+            <pc:sldMk cId="3943863941" sldId="266"/>
+            <ac:graphicFrameMk id="3" creationId="{D57E0903-E71D-4BCE-78A5-A70E9F095074}"/>
+          </ac:graphicFrameMkLst>
+        </pc:graphicFrameChg>
+      </pc:sldChg>
     </pc:docChg>
   </pc:docChgLst>
 </pc:chgInfo>
+</file>
+
+<file path=ppt/notesMasters/notesMaster1.xml><?xml version="1.0" encoding="utf-8"?>
+<p:notesMaster xmlns:a="http://schemas.openxmlformats.org/drawingml/2006/main" xmlns:r="http://schemas.openxmlformats.org/officeDocument/2006/relationships" xmlns:p="http://schemas.openxmlformats.org/presentationml/2006/main">
+  <p:cSld>
+    <p:bg>
+      <p:bgRef idx="1001">
+        <a:schemeClr val="bg1"/>
+      </p:bgRef>
+    </p:bg>
+    <p:spTree>
+      <p:nvGrpSpPr>
+        <p:cNvPr id="1" name=""/>
+        <p:cNvGrpSpPr/>
+        <p:nvPr/>
+      </p:nvGrpSpPr>
+      <p:grpSpPr>
+        <a:xfrm>
+          <a:off x="0" y="0"/>
+          <a:ext cx="0" cy="0"/>
+          <a:chOff x="0" y="0"/>
+          <a:chExt cx="0" cy="0"/>
+        </a:xfrm>
+      </p:grpSpPr>
+      <p:sp>
+        <p:nvSpPr>
+          <p:cNvPr id="2" name="Header Placeholder 1"/>
+          <p:cNvSpPr>
+            <a:spLocks noGrp="1"/>
+          </p:cNvSpPr>
+          <p:nvPr>
+            <p:ph type="hdr" sz="quarter"/>
+          </p:nvPr>
+        </p:nvSpPr>
+        <p:spPr>
+          <a:xfrm>
+            <a:off x="0" y="0"/>
+            <a:ext cx="2971800" cy="458788"/>
+          </a:xfrm>
+          <a:prstGeom prst="rect">
+            <a:avLst/>
+          </a:prstGeom>
+        </p:spPr>
+        <p:txBody>
+          <a:bodyPr vert="horz" lIns="91440" tIns="45720" rIns="91440" bIns="45720" rtlCol="0"/>
+          <a:lstStyle>
+            <a:lvl1pPr algn="l">
+              <a:defRPr sz="1200"/>
+            </a:lvl1pPr>
+          </a:lstStyle>
+          <a:p>
+            <a:endParaRPr lang="en-GB"/>
+          </a:p>
+        </p:txBody>
+      </p:sp>
+      <p:sp>
+        <p:nvSpPr>
+          <p:cNvPr id="3" name="Date Placeholder 2"/>
+          <p:cNvSpPr>
+            <a:spLocks noGrp="1"/>
+          </p:cNvSpPr>
+          <p:nvPr>
+            <p:ph type="dt" idx="1"/>
+          </p:nvPr>
+        </p:nvSpPr>
+        <p:spPr>
+          <a:xfrm>
+            <a:off x="3884613" y="0"/>
+            <a:ext cx="2971800" cy="458788"/>
+          </a:xfrm>
+          <a:prstGeom prst="rect">
+            <a:avLst/>
+          </a:prstGeom>
+        </p:spPr>
+        <p:txBody>
+          <a:bodyPr vert="horz" lIns="91440" tIns="45720" rIns="91440" bIns="45720" rtlCol="0"/>
+          <a:lstStyle>
+            <a:lvl1pPr algn="r">
+              <a:defRPr sz="1200"/>
+            </a:lvl1pPr>
+          </a:lstStyle>
+          <a:p>
+            <a:fld id="{072D18E7-6622-4CBC-A8B5-C0C827BC5C7C}" type="datetimeFigureOut">
+              <a:rPr lang="en-GB" smtClean="0"/>
+              <a:t>04/06/2024</a:t>
+            </a:fld>
+            <a:endParaRPr lang="en-GB"/>
+          </a:p>
+        </p:txBody>
+      </p:sp>
+      <p:sp>
+        <p:nvSpPr>
+          <p:cNvPr id="4" name="Slide Image Placeholder 3"/>
+          <p:cNvSpPr>
+            <a:spLocks noGrp="1" noRot="1" noChangeAspect="1"/>
+          </p:cNvSpPr>
+          <p:nvPr>
+            <p:ph type="sldImg" idx="2"/>
+          </p:nvPr>
+        </p:nvSpPr>
+        <p:spPr>
+          <a:xfrm>
+            <a:off x="685800" y="1143000"/>
+            <a:ext cx="5486400" cy="3086100"/>
+          </a:xfrm>
+          <a:prstGeom prst="rect">
+            <a:avLst/>
+          </a:prstGeom>
+          <a:noFill/>
+          <a:ln w="12700">
+            <a:solidFill>
+              <a:prstClr val="black"/>
+            </a:solidFill>
+          </a:ln>
+        </p:spPr>
+        <p:txBody>
+          <a:bodyPr vert="horz" lIns="91440" tIns="45720" rIns="91440" bIns="45720" rtlCol="0" anchor="ctr"/>
+          <a:lstStyle/>
+          <a:p>
+            <a:endParaRPr lang="en-GB"/>
+          </a:p>
+        </p:txBody>
+      </p:sp>
+      <p:sp>
+        <p:nvSpPr>
+          <p:cNvPr id="5" name="Notes Placeholder 4"/>
+          <p:cNvSpPr>
+            <a:spLocks noGrp="1"/>
+          </p:cNvSpPr>
+          <p:nvPr>
+            <p:ph type="body" sz="quarter" idx="3"/>
+          </p:nvPr>
+        </p:nvSpPr>
+        <p:spPr>
+          <a:xfrm>
+            <a:off x="685800" y="4400550"/>
+            <a:ext cx="5486400" cy="3600450"/>
+          </a:xfrm>
+          <a:prstGeom prst="rect">
+            <a:avLst/>
+          </a:prstGeom>
+        </p:spPr>
+        <p:txBody>
+          <a:bodyPr vert="horz" lIns="91440" tIns="45720" rIns="91440" bIns="45720" rtlCol="0"/>
+          <a:lstStyle/>
+          <a:p>
+            <a:pPr lvl="0"/>
+            <a:r>
+              <a:rPr lang="en-US"/>
+              <a:t>Click to edit Master text styles</a:t>
+            </a:r>
+          </a:p>
+          <a:p>
+            <a:pPr lvl="1"/>
+            <a:r>
+              <a:rPr lang="en-US"/>
+              <a:t>Second level</a:t>
+            </a:r>
+          </a:p>
+          <a:p>
+            <a:pPr lvl="2"/>
+            <a:r>
+              <a:rPr lang="en-US"/>
+              <a:t>Third level</a:t>
+            </a:r>
+          </a:p>
+          <a:p>
+            <a:pPr lvl="3"/>
+            <a:r>
+              <a:rPr lang="en-US"/>
+              <a:t>Fourth level</a:t>
+            </a:r>
+          </a:p>
+          <a:p>
+            <a:pPr lvl="4"/>
+            <a:r>
+              <a:rPr lang="en-US"/>
+              <a:t>Fifth level</a:t>
+            </a:r>
+            <a:endParaRPr lang="en-GB"/>
+          </a:p>
+        </p:txBody>
+      </p:sp>
+      <p:sp>
+        <p:nvSpPr>
+          <p:cNvPr id="6" name="Footer Placeholder 5"/>
+          <p:cNvSpPr>
+            <a:spLocks noGrp="1"/>
+          </p:cNvSpPr>
+          <p:nvPr>
+            <p:ph type="ftr" sz="quarter" idx="4"/>
+          </p:nvPr>
+        </p:nvSpPr>
+        <p:spPr>
+          <a:xfrm>
+            <a:off x="0" y="8685213"/>
+            <a:ext cx="2971800" cy="458787"/>
+          </a:xfrm>
+          <a:prstGeom prst="rect">
+            <a:avLst/>
+          </a:prstGeom>
+        </p:spPr>
+        <p:txBody>
+          <a:bodyPr vert="horz" lIns="91440" tIns="45720" rIns="91440" bIns="45720" rtlCol="0" anchor="b"/>
+          <a:lstStyle>
+            <a:lvl1pPr algn="l">
+              <a:defRPr sz="1200"/>
+            </a:lvl1pPr>
+          </a:lstStyle>
+          <a:p>
+            <a:endParaRPr lang="en-GB"/>
+          </a:p>
+        </p:txBody>
+      </p:sp>
+      <p:sp>
+        <p:nvSpPr>
+          <p:cNvPr id="7" name="Slide Number Placeholder 6"/>
+          <p:cNvSpPr>
+            <a:spLocks noGrp="1"/>
+          </p:cNvSpPr>
+          <p:nvPr>
+            <p:ph type="sldNum" sz="quarter" idx="5"/>
+          </p:nvPr>
+        </p:nvSpPr>
+        <p:spPr>
+          <a:xfrm>
+            <a:off x="3884613" y="8685213"/>
+            <a:ext cx="2971800" cy="458787"/>
+          </a:xfrm>
+          <a:prstGeom prst="rect">
+            <a:avLst/>
+          </a:prstGeom>
+        </p:spPr>
+        <p:txBody>
+          <a:bodyPr vert="horz" lIns="91440" tIns="45720" rIns="91440" bIns="45720" rtlCol="0" anchor="b"/>
+          <a:lstStyle>
+            <a:lvl1pPr algn="r">
+              <a:defRPr sz="1200"/>
+            </a:lvl1pPr>
+          </a:lstStyle>
+          <a:p>
+            <a:fld id="{20685338-632B-46F3-A7B8-1919B858B450}" type="slidenum">
+              <a:rPr lang="en-GB" smtClean="0"/>
+              <a:t>‹#›</a:t>
+            </a:fld>
+            <a:endParaRPr lang="en-GB"/>
+          </a:p>
+        </p:txBody>
+      </p:sp>
+    </p:spTree>
+    <p:extLst>
+      <p:ext uri="{BB962C8B-B14F-4D97-AF65-F5344CB8AC3E}">
+        <p14:creationId xmlns:p14="http://schemas.microsoft.com/office/powerpoint/2010/main" val="2588662356"/>
+      </p:ext>
+    </p:extLst>
+  </p:cSld>
+  <p:clrMap bg1="lt1" tx1="dk1" bg2="lt2" tx2="dk2" accent1="accent1" accent2="accent2" accent3="accent3" accent4="accent4" accent5="accent5" accent6="accent6" hlink="hlink" folHlink="folHlink"/>
+  <p:notesStyle>
+    <a:lvl1pPr marL="0" algn="l" defTabSz="914400" rtl="0" eaLnBrk="1" latinLnBrk="0" hangingPunct="1">
+      <a:defRPr sz="1200" kern="1200">
+        <a:solidFill>
+          <a:schemeClr val="tx1"/>
+        </a:solidFill>
+        <a:latin typeface="+mn-lt"/>
+        <a:ea typeface="+mn-ea"/>
+        <a:cs typeface="+mn-cs"/>
+      </a:defRPr>
+    </a:lvl1pPr>
+    <a:lvl2pPr marL="457200" algn="l" defTabSz="914400" rtl="0" eaLnBrk="1" latinLnBrk="0" hangingPunct="1">
+      <a:defRPr sz="1200" kern="1200">
+        <a:solidFill>
+          <a:schemeClr val="tx1"/>
+        </a:solidFill>
+        <a:latin typeface="+mn-lt"/>
+        <a:ea typeface="+mn-ea"/>
+        <a:cs typeface="+mn-cs"/>
+      </a:defRPr>
+    </a:lvl2pPr>
+    <a:lvl3pPr marL="914400" algn="l" defTabSz="914400" rtl="0" eaLnBrk="1" latinLnBrk="0" hangingPunct="1">
+      <a:defRPr sz="1200" kern="1200">
+        <a:solidFill>
+          <a:schemeClr val="tx1"/>
+        </a:solidFill>
+        <a:latin typeface="+mn-lt"/>
+        <a:ea typeface="+mn-ea"/>
+        <a:cs typeface="+mn-cs"/>
+      </a:defRPr>
+    </a:lvl3pPr>
+    <a:lvl4pPr marL="1371600" algn="l" defTabSz="914400" rtl="0" eaLnBrk="1" latinLnBrk="0" hangingPunct="1">
+      <a:defRPr sz="1200" kern="1200">
+        <a:solidFill>
+          <a:schemeClr val="tx1"/>
+        </a:solidFill>
+        <a:latin typeface="+mn-lt"/>
+        <a:ea typeface="+mn-ea"/>
+        <a:cs typeface="+mn-cs"/>
+      </a:defRPr>
+    </a:lvl4pPr>
+    <a:lvl5pPr marL="1828800" algn="l" defTabSz="914400" rtl="0" eaLnBrk="1" latinLnBrk="0" hangingPunct="1">
+      <a:defRPr sz="1200" kern="1200">
+        <a:solidFill>
+          <a:schemeClr val="tx1"/>
+        </a:solidFill>
+        <a:latin typeface="+mn-lt"/>
+        <a:ea typeface="+mn-ea"/>
+        <a:cs typeface="+mn-cs"/>
+      </a:defRPr>
+    </a:lvl5pPr>
+    <a:lvl6pPr marL="2286000" algn="l" defTabSz="914400" rtl="0" eaLnBrk="1" latinLnBrk="0" hangingPunct="1">
+      <a:defRPr sz="1200" kern="1200">
+        <a:solidFill>
+          <a:schemeClr val="tx1"/>
+        </a:solidFill>
+        <a:latin typeface="+mn-lt"/>
+        <a:ea typeface="+mn-ea"/>
+        <a:cs typeface="+mn-cs"/>
+      </a:defRPr>
+    </a:lvl6pPr>
+    <a:lvl7pPr marL="2743200" algn="l" defTabSz="914400" rtl="0" eaLnBrk="1" latinLnBrk="0" hangingPunct="1">
+      <a:defRPr sz="1200" kern="1200">
+        <a:solidFill>
+          <a:schemeClr val="tx1"/>
+        </a:solidFill>
+        <a:latin typeface="+mn-lt"/>
+        <a:ea typeface="+mn-ea"/>
+        <a:cs typeface="+mn-cs"/>
+      </a:defRPr>
+    </a:lvl7pPr>
+    <a:lvl8pPr marL="3200400" algn="l" defTabSz="914400" rtl="0" eaLnBrk="1" latinLnBrk="0" hangingPunct="1">
+      <a:defRPr sz="1200" kern="1200">
+        <a:solidFill>
+          <a:schemeClr val="tx1"/>
+        </a:solidFill>
+        <a:latin typeface="+mn-lt"/>
+        <a:ea typeface="+mn-ea"/>
+        <a:cs typeface="+mn-cs"/>
+      </a:defRPr>
+    </a:lvl8pPr>
+    <a:lvl9pPr marL="3657600" algn="l" defTabSz="914400" rtl="0" eaLnBrk="1" latinLnBrk="0" hangingPunct="1">
+      <a:defRPr sz="1200" kern="1200">
+        <a:solidFill>
+          <a:schemeClr val="tx1"/>
+        </a:solidFill>
+        <a:latin typeface="+mn-lt"/>
+        <a:ea typeface="+mn-ea"/>
+        <a:cs typeface="+mn-cs"/>
+      </a:defRPr>
+    </a:lvl9pPr>
+  </p:notesStyle>
+</p:notesMaster>
+</file>
+
+<file path=ppt/notesSlides/notesSlide1.xml><?xml version="1.0" encoding="utf-8"?>
+<p:notes xmlns:a="http://schemas.openxmlformats.org/drawingml/2006/main" xmlns:r="http://schemas.openxmlformats.org/officeDocument/2006/relationships" xmlns:p="http://schemas.openxmlformats.org/presentationml/2006/main">
+  <p:cSld>
+    <p:spTree>
+      <p:nvGrpSpPr>
+        <p:cNvPr id="1" name=""/>
+        <p:cNvGrpSpPr/>
+        <p:nvPr/>
+      </p:nvGrpSpPr>
+      <p:grpSpPr>
+        <a:xfrm>
+          <a:off x="0" y="0"/>
+          <a:ext cx="0" cy="0"/>
+          <a:chOff x="0" y="0"/>
+          <a:chExt cx="0" cy="0"/>
+        </a:xfrm>
+      </p:grpSpPr>
+      <p:sp>
+        <p:nvSpPr>
+          <p:cNvPr id="2" name="Slide Image Placeholder 1"/>
+          <p:cNvSpPr>
+            <a:spLocks noGrp="1" noRot="1" noChangeAspect="1"/>
+          </p:cNvSpPr>
+          <p:nvPr>
+            <p:ph type="sldImg"/>
+          </p:nvPr>
+        </p:nvSpPr>
+        <p:spPr/>
+      </p:sp>
+      <p:sp>
+        <p:nvSpPr>
+          <p:cNvPr id="3" name="Notes Placeholder 2"/>
+          <p:cNvSpPr>
+            <a:spLocks noGrp="1"/>
+          </p:cNvSpPr>
+          <p:nvPr>
+            <p:ph type="body" idx="1"/>
+          </p:nvPr>
+        </p:nvSpPr>
+        <p:spPr/>
+        <p:txBody>
+          <a:bodyPr/>
+          <a:lstStyle/>
+          <a:p>
+            <a:endParaRPr lang="en-GB"/>
+          </a:p>
+        </p:txBody>
+      </p:sp>
+      <p:sp>
+        <p:nvSpPr>
+          <p:cNvPr id="4" name="Slide Number Placeholder 3"/>
+          <p:cNvSpPr>
+            <a:spLocks noGrp="1"/>
+          </p:cNvSpPr>
+          <p:nvPr>
+            <p:ph type="sldNum" sz="quarter" idx="5"/>
+          </p:nvPr>
+        </p:nvSpPr>
+        <p:spPr/>
+        <p:txBody>
+          <a:bodyPr/>
+          <a:lstStyle/>
+          <a:p>
+            <a:fld id="{20685338-632B-46F3-A7B8-1919B858B450}" type="slidenum">
+              <a:rPr lang="en-GB" smtClean="0"/>
+              <a:t>2</a:t>
+            </a:fld>
+            <a:endParaRPr lang="en-GB"/>
+          </a:p>
+        </p:txBody>
+      </p:sp>
+    </p:spTree>
+    <p:extLst>
+      <p:ext uri="{BB962C8B-B14F-4D97-AF65-F5344CB8AC3E}">
+        <p14:creationId xmlns:p14="http://schemas.microsoft.com/office/powerpoint/2010/main" val="1020036076"/>
+      </p:ext>
+    </p:extLst>
+  </p:cSld>
+  <p:clrMapOvr>
+    <a:masterClrMapping/>
+  </p:clrMapOvr>
+</p:notes>
 </file>
 
 <file path=ppt/slideLayouts/slideLayout1.xml><?xml version="1.0" encoding="utf-8"?>
@@ -473,7 +1012,7 @@
           <a:p>
             <a:fld id="{9E65EBCE-67F7-456A-9FE8-D2A52E53BACE}" type="datetimeFigureOut">
               <a:rPr lang="en-GB" smtClean="0"/>
-              <a:t>09/03/2024</a:t>
+              <a:t>04/06/2024</a:t>
             </a:fld>
             <a:endParaRPr lang="en-GB"/>
           </a:p>
@@ -673,7 +1212,7 @@
           <a:p>
             <a:fld id="{9E65EBCE-67F7-456A-9FE8-D2A52E53BACE}" type="datetimeFigureOut">
               <a:rPr lang="en-GB" smtClean="0"/>
-              <a:t>09/03/2024</a:t>
+              <a:t>04/06/2024</a:t>
             </a:fld>
             <a:endParaRPr lang="en-GB"/>
           </a:p>
@@ -883,7 +1422,7 @@
           <a:p>
             <a:fld id="{9E65EBCE-67F7-456A-9FE8-D2A52E53BACE}" type="datetimeFigureOut">
               <a:rPr lang="en-GB" smtClean="0"/>
-              <a:t>09/03/2024</a:t>
+              <a:t>04/06/2024</a:t>
             </a:fld>
             <a:endParaRPr lang="en-GB"/>
           </a:p>
@@ -1083,7 +1622,7 @@
           <a:p>
             <a:fld id="{9E65EBCE-67F7-456A-9FE8-D2A52E53BACE}" type="datetimeFigureOut">
               <a:rPr lang="en-GB" smtClean="0"/>
-              <a:t>09/03/2024</a:t>
+              <a:t>04/06/2024</a:t>
             </a:fld>
             <a:endParaRPr lang="en-GB"/>
           </a:p>
@@ -1359,7 +1898,7 @@
           <a:p>
             <a:fld id="{9E65EBCE-67F7-456A-9FE8-D2A52E53BACE}" type="datetimeFigureOut">
               <a:rPr lang="en-GB" smtClean="0"/>
-              <a:t>09/03/2024</a:t>
+              <a:t>04/06/2024</a:t>
             </a:fld>
             <a:endParaRPr lang="en-GB"/>
           </a:p>
@@ -1627,7 +2166,7 @@
           <a:p>
             <a:fld id="{9E65EBCE-67F7-456A-9FE8-D2A52E53BACE}" type="datetimeFigureOut">
               <a:rPr lang="en-GB" smtClean="0"/>
-              <a:t>09/03/2024</a:t>
+              <a:t>04/06/2024</a:t>
             </a:fld>
             <a:endParaRPr lang="en-GB"/>
           </a:p>
@@ -2042,7 +2581,7 @@
           <a:p>
             <a:fld id="{9E65EBCE-67F7-456A-9FE8-D2A52E53BACE}" type="datetimeFigureOut">
               <a:rPr lang="en-GB" smtClean="0"/>
-              <a:t>09/03/2024</a:t>
+              <a:t>04/06/2024</a:t>
             </a:fld>
             <a:endParaRPr lang="en-GB"/>
           </a:p>
@@ -2184,7 +2723,7 @@
           <a:p>
             <a:fld id="{9E65EBCE-67F7-456A-9FE8-D2A52E53BACE}" type="datetimeFigureOut">
               <a:rPr lang="en-GB" smtClean="0"/>
-              <a:t>09/03/2024</a:t>
+              <a:t>04/06/2024</a:t>
             </a:fld>
             <a:endParaRPr lang="en-GB"/>
           </a:p>
@@ -2297,7 +2836,7 @@
           <a:p>
             <a:fld id="{9E65EBCE-67F7-456A-9FE8-D2A52E53BACE}" type="datetimeFigureOut">
               <a:rPr lang="en-GB" smtClean="0"/>
-              <a:t>09/03/2024</a:t>
+              <a:t>04/06/2024</a:t>
             </a:fld>
             <a:endParaRPr lang="en-GB"/>
           </a:p>
@@ -2610,7 +3149,7 @@
           <a:p>
             <a:fld id="{9E65EBCE-67F7-456A-9FE8-D2A52E53BACE}" type="datetimeFigureOut">
               <a:rPr lang="en-GB" smtClean="0"/>
-              <a:t>09/03/2024</a:t>
+              <a:t>04/06/2024</a:t>
             </a:fld>
             <a:endParaRPr lang="en-GB"/>
           </a:p>
@@ -2899,7 +3438,7 @@
           <a:p>
             <a:fld id="{9E65EBCE-67F7-456A-9FE8-D2A52E53BACE}" type="datetimeFigureOut">
               <a:rPr lang="en-GB" smtClean="0"/>
-              <a:t>09/03/2024</a:t>
+              <a:t>04/06/2024</a:t>
             </a:fld>
             <a:endParaRPr lang="en-GB"/>
           </a:p>
@@ -3142,7 +3681,7 @@
           <a:p>
             <a:fld id="{9E65EBCE-67F7-456A-9FE8-D2A52E53BACE}" type="datetimeFigureOut">
               <a:rPr lang="en-GB" smtClean="0"/>
-              <a:t>09/03/2024</a:t>
+              <a:t>04/06/2024</a:t>
             </a:fld>
             <a:endParaRPr lang="en-GB"/>
           </a:p>
@@ -4054,7 +4593,7 @@
             </p:xfrm>
             <a:graphic>
               <a:graphicData uri="http://schemas.microsoft.com/office/webextensions/webextension/2010/11">
-                <we:webextensionref xmlns:we="http://schemas.microsoft.com/office/webextensions/webextension/2010/11" xmlns:r="http://schemas.openxmlformats.org/officeDocument/2006/relationships" r:id="rId2"/>
+                <we:webextensionref xmlns:we="http://schemas.microsoft.com/office/webextensions/webextension/2010/11" xmlns:r="http://schemas.openxmlformats.org/officeDocument/2006/relationships" r:id="rId3"/>
               </a:graphicData>
             </a:graphic>
           </p:graphicFrame>
@@ -4075,7 +4614,7 @@
               <p:nvPr/>
             </p:nvPicPr>
             <p:blipFill>
-              <a:blip r:embed="rId3"/>
+              <a:blip r:embed="rId4"/>
               <a:stretch>
                 <a:fillRect/>
               </a:stretch>
@@ -4084,6 +4623,72 @@
               <a:xfrm>
                 <a:off x="0" y="0"/>
                 <a:ext cx="12192000" cy="6858000"/>
+              </a:xfrm>
+              <a:prstGeom prst="rect">
+                <a:avLst/>
+              </a:prstGeom>
+            </p:spPr>
+          </p:pic>
+        </mc:Fallback>
+      </mc:AlternateContent>
+      <mc:AlternateContent xmlns:mc="http://schemas.openxmlformats.org/markup-compatibility/2006">
+        <mc:Choice xmlns:we="http://schemas.microsoft.com/office/webextensions/webextension/2010/11" xmlns:pca="http://schemas.microsoft.com/office/powerpoint/2013/contentapp" Requires="we pca">
+          <p:graphicFrame>
+            <p:nvGraphicFramePr>
+              <p:cNvPr id="3" name="Add-in 2">
+                <a:extLst>
+                  <a:ext uri="{FF2B5EF4-FFF2-40B4-BE49-F238E27FC236}">
+                    <a16:creationId xmlns:a16="http://schemas.microsoft.com/office/drawing/2014/main" id="{F56E645C-F9BF-25D2-1E5E-05B4D6D99814}"/>
+                  </a:ext>
+                </a:extLst>
+              </p:cNvPr>
+              <p:cNvGraphicFramePr>
+                <a:graphicFrameLocks noGrp="1"/>
+              </p:cNvGraphicFramePr>
+              <p:nvPr>
+                <p:extLst>
+                  <p:ext uri="{D42A27DB-BD31-4B8C-83A1-F6EECF244321}">
+                    <p14:modId xmlns:p14="http://schemas.microsoft.com/office/powerpoint/2010/main" val="199156400"/>
+                  </p:ext>
+                </p:extLst>
+              </p:nvPr>
+            </p:nvGraphicFramePr>
+            <p:xfrm>
+              <a:off x="175097" y="223736"/>
+              <a:ext cx="11858018" cy="6391073"/>
+            </p:xfrm>
+            <a:graphic>
+              <a:graphicData uri="http://schemas.microsoft.com/office/webextensions/webextension/2010/11">
+                <we:webextensionref xmlns:we="http://schemas.microsoft.com/office/webextensions/webextension/2010/11" xmlns:r="http://schemas.openxmlformats.org/officeDocument/2006/relationships" r:id="rId5"/>
+              </a:graphicData>
+            </a:graphic>
+          </p:graphicFrame>
+        </mc:Choice>
+        <mc:Fallback>
+          <p:pic>
+            <p:nvPicPr>
+              <p:cNvPr id="3" name="Add-in 2">
+                <a:extLst>
+                  <a:ext uri="{FF2B5EF4-FFF2-40B4-BE49-F238E27FC236}">
+                    <a16:creationId xmlns:a16="http://schemas.microsoft.com/office/drawing/2014/main" id="{F56E645C-F9BF-25D2-1E5E-05B4D6D99814}"/>
+                  </a:ext>
+                </a:extLst>
+              </p:cNvPr>
+              <p:cNvPicPr>
+                <a:picLocks noGrp="1" noRot="1" noChangeAspect="1" noMove="1" noResize="1" noEditPoints="1" noAdjustHandles="1" noChangeArrowheads="1" noChangeShapeType="1"/>
+              </p:cNvPicPr>
+              <p:nvPr/>
+            </p:nvPicPr>
+            <p:blipFill>
+              <a:blip r:embed="rId4"/>
+              <a:stretch>
+                <a:fillRect/>
+              </a:stretch>
+            </p:blipFill>
+            <p:spPr>
+              <a:xfrm>
+                <a:off x="175097" y="223736"/>
+                <a:ext cx="11858018" cy="6391073"/>
               </a:xfrm>
               <a:prstGeom prst="rect">
                 <a:avLst/>
@@ -4188,6 +4793,72 @@
           </p:pic>
         </mc:Fallback>
       </mc:AlternateContent>
+      <mc:AlternateContent xmlns:mc="http://schemas.openxmlformats.org/markup-compatibility/2006">
+        <mc:Choice xmlns:we="http://schemas.microsoft.com/office/webextensions/webextension/2010/11" xmlns:pca="http://schemas.microsoft.com/office/powerpoint/2013/contentapp" Requires="we pca">
+          <p:graphicFrame>
+            <p:nvGraphicFramePr>
+              <p:cNvPr id="3" name="Add-in 2">
+                <a:extLst>
+                  <a:ext uri="{FF2B5EF4-FFF2-40B4-BE49-F238E27FC236}">
+                    <a16:creationId xmlns:a16="http://schemas.microsoft.com/office/drawing/2014/main" id="{8AA0450F-3BF0-C2D5-0124-895E728E6DF0}"/>
+                  </a:ext>
+                </a:extLst>
+              </p:cNvPr>
+              <p:cNvGraphicFramePr>
+                <a:graphicFrameLocks noGrp="1"/>
+              </p:cNvGraphicFramePr>
+              <p:nvPr>
+                <p:extLst>
+                  <p:ext uri="{D42A27DB-BD31-4B8C-83A1-F6EECF244321}">
+                    <p14:modId xmlns:p14="http://schemas.microsoft.com/office/powerpoint/2010/main" val="2956206008"/>
+                  </p:ext>
+                </p:extLst>
+              </p:nvPr>
+            </p:nvGraphicFramePr>
+            <p:xfrm>
+              <a:off x="145915" y="223736"/>
+              <a:ext cx="11887200" cy="6391073"/>
+            </p:xfrm>
+            <a:graphic>
+              <a:graphicData uri="http://schemas.microsoft.com/office/webextensions/webextension/2010/11">
+                <we:webextensionref xmlns:we="http://schemas.microsoft.com/office/webextensions/webextension/2010/11" xmlns:r="http://schemas.openxmlformats.org/officeDocument/2006/relationships" r:id="rId4"/>
+              </a:graphicData>
+            </a:graphic>
+          </p:graphicFrame>
+        </mc:Choice>
+        <mc:Fallback>
+          <p:pic>
+            <p:nvPicPr>
+              <p:cNvPr id="3" name="Add-in 2">
+                <a:extLst>
+                  <a:ext uri="{FF2B5EF4-FFF2-40B4-BE49-F238E27FC236}">
+                    <a16:creationId xmlns:a16="http://schemas.microsoft.com/office/drawing/2014/main" id="{8AA0450F-3BF0-C2D5-0124-895E728E6DF0}"/>
+                  </a:ext>
+                </a:extLst>
+              </p:cNvPr>
+              <p:cNvPicPr>
+                <a:picLocks noGrp="1" noRot="1" noChangeAspect="1" noMove="1" noResize="1" noEditPoints="1" noAdjustHandles="1" noChangeArrowheads="1" noChangeShapeType="1"/>
+              </p:cNvPicPr>
+              <p:nvPr/>
+            </p:nvPicPr>
+            <p:blipFill>
+              <a:blip r:embed="rId3"/>
+              <a:stretch>
+                <a:fillRect/>
+              </a:stretch>
+            </p:blipFill>
+            <p:spPr>
+              <a:xfrm>
+                <a:off x="145915" y="223736"/>
+                <a:ext cx="11887200" cy="6391073"/>
+              </a:xfrm>
+              <a:prstGeom prst="rect">
+                <a:avLst/>
+              </a:prstGeom>
+            </p:spPr>
+          </p:pic>
+        </mc:Fallback>
+      </mc:AlternateContent>
     </p:spTree>
     <p:extLst>
       <p:ext uri="{BB962C8B-B14F-4D97-AF65-F5344CB8AC3E}">
@@ -4276,6 +4947,72 @@
               <a:xfrm>
                 <a:off x="0" y="0"/>
                 <a:ext cx="12192000" cy="6858000"/>
+              </a:xfrm>
+              <a:prstGeom prst="rect">
+                <a:avLst/>
+              </a:prstGeom>
+            </p:spPr>
+          </p:pic>
+        </mc:Fallback>
+      </mc:AlternateContent>
+      <mc:AlternateContent xmlns:mc="http://schemas.openxmlformats.org/markup-compatibility/2006">
+        <mc:Choice xmlns:we="http://schemas.microsoft.com/office/webextensions/webextension/2010/11" xmlns:pca="http://schemas.microsoft.com/office/powerpoint/2013/contentapp" Requires="we pca">
+          <p:graphicFrame>
+            <p:nvGraphicFramePr>
+              <p:cNvPr id="3" name="Add-in 2">
+                <a:extLst>
+                  <a:ext uri="{FF2B5EF4-FFF2-40B4-BE49-F238E27FC236}">
+                    <a16:creationId xmlns:a16="http://schemas.microsoft.com/office/drawing/2014/main" id="{D57E0903-E71D-4BCE-78A5-A70E9F095074}"/>
+                  </a:ext>
+                </a:extLst>
+              </p:cNvPr>
+              <p:cNvGraphicFramePr>
+                <a:graphicFrameLocks noGrp="1"/>
+              </p:cNvGraphicFramePr>
+              <p:nvPr>
+                <p:extLst>
+                  <p:ext uri="{D42A27DB-BD31-4B8C-83A1-F6EECF244321}">
+                    <p14:modId xmlns:p14="http://schemas.microsoft.com/office/powerpoint/2010/main" val="3702372884"/>
+                  </p:ext>
+                </p:extLst>
+              </p:nvPr>
+            </p:nvGraphicFramePr>
+            <p:xfrm>
+              <a:off x="155643" y="223736"/>
+              <a:ext cx="11896927" cy="6410527"/>
+            </p:xfrm>
+            <a:graphic>
+              <a:graphicData uri="http://schemas.microsoft.com/office/webextensions/webextension/2010/11">
+                <we:webextensionref xmlns:we="http://schemas.microsoft.com/office/webextensions/webextension/2010/11" xmlns:r="http://schemas.openxmlformats.org/officeDocument/2006/relationships" r:id="rId4"/>
+              </a:graphicData>
+            </a:graphic>
+          </p:graphicFrame>
+        </mc:Choice>
+        <mc:Fallback>
+          <p:pic>
+            <p:nvPicPr>
+              <p:cNvPr id="3" name="Add-in 2">
+                <a:extLst>
+                  <a:ext uri="{FF2B5EF4-FFF2-40B4-BE49-F238E27FC236}">
+                    <a16:creationId xmlns:a16="http://schemas.microsoft.com/office/drawing/2014/main" id="{D57E0903-E71D-4BCE-78A5-A70E9F095074}"/>
+                  </a:ext>
+                </a:extLst>
+              </p:cNvPr>
+              <p:cNvPicPr>
+                <a:picLocks noGrp="1" noRot="1" noChangeAspect="1" noMove="1" noResize="1" noEditPoints="1" noAdjustHandles="1" noChangeArrowheads="1" noChangeShapeType="1"/>
+              </p:cNvPicPr>
+              <p:nvPr/>
+            </p:nvPicPr>
+            <p:blipFill>
+              <a:blip r:embed="rId3"/>
+              <a:stretch>
+                <a:fillRect/>
+              </a:stretch>
+            </p:blipFill>
+            <p:spPr>
+              <a:xfrm>
+                <a:off x="155643" y="223736"/>
+                <a:ext cx="11896927" cy="6410527"/>
               </a:xfrm>
               <a:prstGeom prst="rect">
                 <a:avLst/>
@@ -4787,6 +5524,96 @@
 </file>
 
 <file path=ppt/slides/slide6.xml><?xml version="1.0" encoding="utf-8"?>
+<p:sld xmlns:a="http://schemas.openxmlformats.org/drawingml/2006/main" xmlns:r="http://schemas.openxmlformats.org/officeDocument/2006/relationships" xmlns:p="http://schemas.openxmlformats.org/presentationml/2006/main">
+  <p:cSld>
+    <p:spTree>
+      <p:nvGrpSpPr>
+        <p:cNvPr id="1" name=""/>
+        <p:cNvGrpSpPr/>
+        <p:nvPr/>
+      </p:nvGrpSpPr>
+      <p:grpSpPr>
+        <a:xfrm>
+          <a:off x="0" y="0"/>
+          <a:ext cx="0" cy="0"/>
+          <a:chOff x="0" y="0"/>
+          <a:chExt cx="0" cy="0"/>
+        </a:xfrm>
+      </p:grpSpPr>
+      <mc:AlternateContent xmlns:mc="http://schemas.openxmlformats.org/markup-compatibility/2006" xmlns:we="http://schemas.microsoft.com/office/webextensions/webextension/2010/11" xmlns:pca="http://schemas.microsoft.com/office/powerpoint/2013/contentapp">
+        <mc:Choice Requires="we pca">
+          <p:graphicFrame>
+            <p:nvGraphicFramePr>
+              <p:cNvPr id="4" name="Add-in 3">
+                <a:extLst>
+                  <a:ext uri="{FF2B5EF4-FFF2-40B4-BE49-F238E27FC236}">
+                    <a16:creationId xmlns:a16="http://schemas.microsoft.com/office/drawing/2014/main" id="{F6AF5423-F83E-0BEC-EEF5-DFF065A0C6F1}"/>
+                  </a:ext>
+                </a:extLst>
+              </p:cNvPr>
+              <p:cNvGraphicFramePr>
+                <a:graphicFrameLocks noGrp="1"/>
+              </p:cNvGraphicFramePr>
+              <p:nvPr/>
+            </p:nvGraphicFramePr>
+            <p:xfrm>
+              <a:off x="1333500" y="571499"/>
+              <a:ext cx="9525000" cy="5715000"/>
+            </p:xfrm>
+            <a:graphic>
+              <a:graphicData uri="http://schemas.microsoft.com/office/webextensions/webextension/2010/11">
+                <we:webextensionref xmlns:we="http://schemas.microsoft.com/office/webextensions/webextension/2010/11" xmlns:r="http://schemas.openxmlformats.org/officeDocument/2006/relationships" r:id="rId2"/>
+              </a:graphicData>
+            </a:graphic>
+          </p:graphicFrame>
+        </mc:Choice>
+        <mc:Fallback xmlns="">
+          <p:pic>
+            <p:nvPicPr>
+              <p:cNvPr id="4" name="Add-in 3">
+                <a:extLst>
+                  <a:ext uri="{FF2B5EF4-FFF2-40B4-BE49-F238E27FC236}">
+                    <a16:creationId xmlns:a16="http://schemas.microsoft.com/office/drawing/2014/main" id="{F6AF5423-F83E-0BEC-EEF5-DFF065A0C6F1}"/>
+                  </a:ext>
+                </a:extLst>
+              </p:cNvPr>
+              <p:cNvPicPr>
+                <a:picLocks noGrp="1" noRot="1" noChangeAspect="1" noMove="1" noResize="1" noEditPoints="1" noAdjustHandles="1" noChangeArrowheads="1" noChangeShapeType="1"/>
+              </p:cNvPicPr>
+              <p:nvPr/>
+            </p:nvPicPr>
+            <p:blipFill>
+              <a:blip r:embed="rId3"/>
+              <a:stretch>
+                <a:fillRect/>
+              </a:stretch>
+            </p:blipFill>
+            <p:spPr>
+              <a:xfrm>
+                <a:off x="1333500" y="571499"/>
+                <a:ext cx="9525000" cy="5715000"/>
+              </a:xfrm>
+              <a:prstGeom prst="rect">
+                <a:avLst/>
+              </a:prstGeom>
+            </p:spPr>
+          </p:pic>
+        </mc:Fallback>
+      </mc:AlternateContent>
+    </p:spTree>
+    <p:extLst>
+      <p:ext uri="{BB962C8B-B14F-4D97-AF65-F5344CB8AC3E}">
+        <p14:creationId xmlns:p14="http://schemas.microsoft.com/office/powerpoint/2010/main" val="1521618409"/>
+      </p:ext>
+    </p:extLst>
+  </p:cSld>
+  <p:clrMapOvr>
+    <a:masterClrMapping/>
+  </p:clrMapOvr>
+</p:sld>
+</file>
+
+<file path=ppt/slides/slide7.xml><?xml version="1.0" encoding="utf-8"?>
 <p:sld xmlns:a="http://schemas.openxmlformats.org/drawingml/2006/main" xmlns:r="http://schemas.openxmlformats.org/officeDocument/2006/relationships" xmlns:p="http://schemas.openxmlformats.org/presentationml/2006/main">
   <p:cSld>
     <p:spTree>
@@ -5534,6 +6361,321 @@
 </a:theme>
 </file>
 
+<file path=ppt/theme/theme2.xml><?xml version="1.0" encoding="utf-8"?>
+<a:theme xmlns:a="http://schemas.openxmlformats.org/drawingml/2006/main" name="Office Theme">
+  <a:themeElements>
+    <a:clrScheme name="Office">
+      <a:dk1>
+        <a:sysClr val="windowText" lastClr="000000"/>
+      </a:dk1>
+      <a:lt1>
+        <a:sysClr val="window" lastClr="FFFFFF"/>
+      </a:lt1>
+      <a:dk2>
+        <a:srgbClr val="0E2841"/>
+      </a:dk2>
+      <a:lt2>
+        <a:srgbClr val="E8E8E8"/>
+      </a:lt2>
+      <a:accent1>
+        <a:srgbClr val="156082"/>
+      </a:accent1>
+      <a:accent2>
+        <a:srgbClr val="E97132"/>
+      </a:accent2>
+      <a:accent3>
+        <a:srgbClr val="196B24"/>
+      </a:accent3>
+      <a:accent4>
+        <a:srgbClr val="0F9ED5"/>
+      </a:accent4>
+      <a:accent5>
+        <a:srgbClr val="A02B93"/>
+      </a:accent5>
+      <a:accent6>
+        <a:srgbClr val="4EA72E"/>
+      </a:accent6>
+      <a:hlink>
+        <a:srgbClr val="467886"/>
+      </a:hlink>
+      <a:folHlink>
+        <a:srgbClr val="96607D"/>
+      </a:folHlink>
+    </a:clrScheme>
+    <a:fontScheme name="Office">
+      <a:majorFont>
+        <a:latin typeface="Aptos Display" panose="02110004020202020204"/>
+        <a:ea typeface=""/>
+        <a:cs typeface=""/>
+        <a:font script="Jpan" typeface="游ゴシック Light"/>
+        <a:font script="Hang" typeface="맑은 고딕"/>
+        <a:font script="Hans" typeface="等线 Light"/>
+        <a:font script="Hant" typeface="新細明體"/>
+        <a:font script="Arab" typeface="Times New Roman"/>
+        <a:font script="Hebr" typeface="Times New Roman"/>
+        <a:font script="Thai" typeface="Angsana New"/>
+        <a:font script="Ethi" typeface="Nyala"/>
+        <a:font script="Beng" typeface="Vrinda"/>
+        <a:font script="Gujr" typeface="Shruti"/>
+        <a:font script="Khmr" typeface="MoolBoran"/>
+        <a:font script="Knda" typeface="Tunga"/>
+        <a:font script="Guru" typeface="Raavi"/>
+        <a:font script="Cans" typeface="Euphemia"/>
+        <a:font script="Cher" typeface="Plantagenet Cherokee"/>
+        <a:font script="Yiii" typeface="Microsoft Yi Baiti"/>
+        <a:font script="Tibt" typeface="Microsoft Himalaya"/>
+        <a:font script="Thaa" typeface="MV Boli"/>
+        <a:font script="Deva" typeface="Mangal"/>
+        <a:font script="Telu" typeface="Gautami"/>
+        <a:font script="Taml" typeface="Latha"/>
+        <a:font script="Syrc" typeface="Estrangelo Edessa"/>
+        <a:font script="Orya" typeface="Kalinga"/>
+        <a:font script="Mlym" typeface="Kartika"/>
+        <a:font script="Laoo" typeface="DokChampa"/>
+        <a:font script="Sinh" typeface="Iskoola Pota"/>
+        <a:font script="Mong" typeface="Mongolian Baiti"/>
+        <a:font script="Viet" typeface="Times New Roman"/>
+        <a:font script="Uigh" typeface="Microsoft Uighur"/>
+        <a:font script="Geor" typeface="Sylfaen"/>
+        <a:font script="Armn" typeface="Arial"/>
+        <a:font script="Bugi" typeface="Leelawadee UI"/>
+        <a:font script="Bopo" typeface="Microsoft JhengHei"/>
+        <a:font script="Java" typeface="Javanese Text"/>
+        <a:font script="Lisu" typeface="Segoe UI"/>
+        <a:font script="Mymr" typeface="Myanmar Text"/>
+        <a:font script="Nkoo" typeface="Ebrima"/>
+        <a:font script="Olck" typeface="Nirmala UI"/>
+        <a:font script="Osma" typeface="Ebrima"/>
+        <a:font script="Phag" typeface="Phagspa"/>
+        <a:font script="Syrn" typeface="Estrangelo Edessa"/>
+        <a:font script="Syrj" typeface="Estrangelo Edessa"/>
+        <a:font script="Syre" typeface="Estrangelo Edessa"/>
+        <a:font script="Sora" typeface="Nirmala UI"/>
+        <a:font script="Tale" typeface="Microsoft Tai Le"/>
+        <a:font script="Talu" typeface="Microsoft New Tai Lue"/>
+        <a:font script="Tfng" typeface="Ebrima"/>
+      </a:majorFont>
+      <a:minorFont>
+        <a:latin typeface="Aptos" panose="02110004020202020204"/>
+        <a:ea typeface=""/>
+        <a:cs typeface=""/>
+        <a:font script="Jpan" typeface="游ゴシック"/>
+        <a:font script="Hang" typeface="맑은 고딕"/>
+        <a:font script="Hans" typeface="等线"/>
+        <a:font script="Hant" typeface="新細明體"/>
+        <a:font script="Arab" typeface="Arial"/>
+        <a:font script="Hebr" typeface="Arial"/>
+        <a:font script="Thai" typeface="Cordia New"/>
+        <a:font script="Ethi" typeface="Nyala"/>
+        <a:font script="Beng" typeface="Vrinda"/>
+        <a:font script="Gujr" typeface="Shruti"/>
+        <a:font script="Khmr" typeface="DaunPenh"/>
+        <a:font script="Knda" typeface="Tunga"/>
+        <a:font script="Guru" typeface="Raavi"/>
+        <a:font script="Cans" typeface="Euphemia"/>
+        <a:font script="Cher" typeface="Plantagenet Cherokee"/>
+        <a:font script="Yiii" typeface="Microsoft Yi Baiti"/>
+        <a:font script="Tibt" typeface="Microsoft Himalaya"/>
+        <a:font script="Thaa" typeface="MV Boli"/>
+        <a:font script="Deva" typeface="Mangal"/>
+        <a:font script="Telu" typeface="Gautami"/>
+        <a:font script="Taml" typeface="Latha"/>
+        <a:font script="Syrc" typeface="Estrangelo Edessa"/>
+        <a:font script="Orya" typeface="Kalinga"/>
+        <a:font script="Mlym" typeface="Kartika"/>
+        <a:font script="Laoo" typeface="DokChampa"/>
+        <a:font script="Sinh" typeface="Iskoola Pota"/>
+        <a:font script="Mong" typeface="Mongolian Baiti"/>
+        <a:font script="Viet" typeface="Arial"/>
+        <a:font script="Uigh" typeface="Microsoft Uighur"/>
+        <a:font script="Geor" typeface="Sylfaen"/>
+        <a:font script="Armn" typeface="Arial"/>
+        <a:font script="Bugi" typeface="Leelawadee UI"/>
+        <a:font script="Bopo" typeface="Microsoft JhengHei"/>
+        <a:font script="Java" typeface="Javanese Text"/>
+        <a:font script="Lisu" typeface="Segoe UI"/>
+        <a:font script="Mymr" typeface="Myanmar Text"/>
+        <a:font script="Nkoo" typeface="Ebrima"/>
+        <a:font script="Olck" typeface="Nirmala UI"/>
+        <a:font script="Osma" typeface="Ebrima"/>
+        <a:font script="Phag" typeface="Phagspa"/>
+        <a:font script="Syrn" typeface="Estrangelo Edessa"/>
+        <a:font script="Syrj" typeface="Estrangelo Edessa"/>
+        <a:font script="Syre" typeface="Estrangelo Edessa"/>
+        <a:font script="Sora" typeface="Nirmala UI"/>
+        <a:font script="Tale" typeface="Microsoft Tai Le"/>
+        <a:font script="Talu" typeface="Microsoft New Tai Lue"/>
+        <a:font script="Tfng" typeface="Ebrima"/>
+      </a:minorFont>
+    </a:fontScheme>
+    <a:fmtScheme name="Office">
+      <a:fillStyleLst>
+        <a:solidFill>
+          <a:schemeClr val="phClr"/>
+        </a:solidFill>
+        <a:gradFill rotWithShape="1">
+          <a:gsLst>
+            <a:gs pos="0">
+              <a:schemeClr val="phClr">
+                <a:lumMod val="110000"/>
+                <a:satMod val="105000"/>
+                <a:tint val="67000"/>
+              </a:schemeClr>
+            </a:gs>
+            <a:gs pos="50000">
+              <a:schemeClr val="phClr">
+                <a:lumMod val="105000"/>
+                <a:satMod val="103000"/>
+                <a:tint val="73000"/>
+              </a:schemeClr>
+            </a:gs>
+            <a:gs pos="100000">
+              <a:schemeClr val="phClr">
+                <a:lumMod val="105000"/>
+                <a:satMod val="109000"/>
+                <a:tint val="81000"/>
+              </a:schemeClr>
+            </a:gs>
+          </a:gsLst>
+          <a:lin ang="5400000" scaled="0"/>
+        </a:gradFill>
+        <a:gradFill rotWithShape="1">
+          <a:gsLst>
+            <a:gs pos="0">
+              <a:schemeClr val="phClr">
+                <a:satMod val="103000"/>
+                <a:lumMod val="102000"/>
+                <a:tint val="94000"/>
+              </a:schemeClr>
+            </a:gs>
+            <a:gs pos="50000">
+              <a:schemeClr val="phClr">
+                <a:satMod val="110000"/>
+                <a:lumMod val="100000"/>
+                <a:shade val="100000"/>
+              </a:schemeClr>
+            </a:gs>
+            <a:gs pos="100000">
+              <a:schemeClr val="phClr">
+                <a:lumMod val="99000"/>
+                <a:satMod val="120000"/>
+                <a:shade val="78000"/>
+              </a:schemeClr>
+            </a:gs>
+          </a:gsLst>
+          <a:lin ang="5400000" scaled="0"/>
+        </a:gradFill>
+      </a:fillStyleLst>
+      <a:lnStyleLst>
+        <a:ln w="12700" cap="flat" cmpd="sng" algn="ctr">
+          <a:solidFill>
+            <a:schemeClr val="phClr"/>
+          </a:solidFill>
+          <a:prstDash val="solid"/>
+          <a:miter lim="800000"/>
+        </a:ln>
+        <a:ln w="19050" cap="flat" cmpd="sng" algn="ctr">
+          <a:solidFill>
+            <a:schemeClr val="phClr"/>
+          </a:solidFill>
+          <a:prstDash val="solid"/>
+          <a:miter lim="800000"/>
+        </a:ln>
+        <a:ln w="25400" cap="flat" cmpd="sng" algn="ctr">
+          <a:solidFill>
+            <a:schemeClr val="phClr"/>
+          </a:solidFill>
+          <a:prstDash val="solid"/>
+          <a:miter lim="800000"/>
+        </a:ln>
+      </a:lnStyleLst>
+      <a:effectStyleLst>
+        <a:effectStyle>
+          <a:effectLst/>
+        </a:effectStyle>
+        <a:effectStyle>
+          <a:effectLst/>
+        </a:effectStyle>
+        <a:effectStyle>
+          <a:effectLst>
+            <a:outerShdw blurRad="57150" dist="19050" dir="5400000" algn="ctr" rotWithShape="0">
+              <a:srgbClr val="000000">
+                <a:alpha val="63000"/>
+              </a:srgbClr>
+            </a:outerShdw>
+          </a:effectLst>
+        </a:effectStyle>
+      </a:effectStyleLst>
+      <a:bgFillStyleLst>
+        <a:solidFill>
+          <a:schemeClr val="phClr"/>
+        </a:solidFill>
+        <a:solidFill>
+          <a:schemeClr val="phClr">
+            <a:tint val="95000"/>
+            <a:satMod val="170000"/>
+          </a:schemeClr>
+        </a:solidFill>
+        <a:gradFill rotWithShape="1">
+          <a:gsLst>
+            <a:gs pos="0">
+              <a:schemeClr val="phClr">
+                <a:tint val="93000"/>
+                <a:satMod val="150000"/>
+                <a:shade val="98000"/>
+                <a:lumMod val="102000"/>
+              </a:schemeClr>
+            </a:gs>
+            <a:gs pos="50000">
+              <a:schemeClr val="phClr">
+                <a:tint val="98000"/>
+                <a:satMod val="130000"/>
+                <a:shade val="90000"/>
+                <a:lumMod val="103000"/>
+              </a:schemeClr>
+            </a:gs>
+            <a:gs pos="100000">
+              <a:schemeClr val="phClr">
+                <a:shade val="63000"/>
+                <a:satMod val="120000"/>
+              </a:schemeClr>
+            </a:gs>
+          </a:gsLst>
+          <a:lin ang="5400000" scaled="0"/>
+        </a:gradFill>
+      </a:bgFillStyleLst>
+    </a:fmtScheme>
+  </a:themeElements>
+  <a:objectDefaults>
+    <a:lnDef>
+      <a:spPr/>
+      <a:bodyPr/>
+      <a:lstStyle/>
+      <a:style>
+        <a:lnRef idx="2">
+          <a:schemeClr val="accent1"/>
+        </a:lnRef>
+        <a:fillRef idx="0">
+          <a:schemeClr val="accent1"/>
+        </a:fillRef>
+        <a:effectRef idx="1">
+          <a:schemeClr val="accent1"/>
+        </a:effectRef>
+        <a:fontRef idx="minor">
+          <a:schemeClr val="tx1"/>
+        </a:fontRef>
+      </a:style>
+    </a:lnDef>
+  </a:objectDefaults>
+  <a:extraClrSchemeLst/>
+  <a:extLst>
+    <a:ext uri="{05A4C25C-085E-4340-85A3-A5531E510DB2}">
+      <thm15:themeFamily xmlns:thm15="http://schemas.microsoft.com/office/thememl/2012/main" name="Office Theme" id="{2E142A2C-CD16-42D6-873A-C26D2A0506FA}" vid="{1BDDFF52-6CD6-40A5-AB3C-68EB2F1E4D0A}"/>
+    </a:ext>
+  </a:extLst>
+</a:theme>
+</file>
+
 <file path=ppt/webextensions/webextension1.xml><?xml version="1.0" encoding="utf-8"?>
 <we:webextension xmlns:we="http://schemas.microsoft.com/office/webextensions/webextension/2010/11" id="{9F7D2809-27B3-400B-B1F3-FD0552FB5A13}">
   <we:reference id="wa200003233" version="2.0.0.3" store="en-US" storeType="OMEX"/>
@@ -5541,24 +6683,24 @@
     <we:reference id="WA200003233" version="2.0.0.3" store="WA200003233" storeType="OMEX"/>
   </we:alternateReferences>
   <we:properties>
-    <we:property name="pptInsertionSessionID" value="&quot;E80A8102-2D23-4D32-9236-2AF6E191FD70&quot;"/>
-    <we:property name="reportUrl" value="&quot;/groups/me/reports/2f39f5dc-b270-48fd-90fd-e32fa9530203/ReportSection?bookmarkGuid=299daa71-4d56-4dc7-95ed-fdc89d09c24e&amp;bookmarkUsage=1&amp;ctid=283ffb50-a30b-488c-90f4-cdae4f7ae6d1&amp;fromEntryPoint=export&quot;"/>
-    <we:property name="reportName" value="&quot;NHS NECSU&quot;"/>
-    <we:property name="reportState" value="&quot;CONNECTED&quot;"/>
+    <we:property name="artifactViewState" value="&quot;live&quot;"/>
+    <we:property name="backgroundColor" value="&quot;#FFFFFF&quot;"/>
+    <we:property name="bookmark" value="&quot;H4sIAAAAAAAAA+1a3XPTOBD/V278wkvuxvqWeKMF7m7mjmFoh3tgOpmVtEoNjp2xHaDH9H+/tZ0epE0JpLTpAH1yJHu1Hz+t9rfqhywW7aKEs2cwx+xhdlDXb+bQvPmFZZOsWh+DJCKK6HKNzBkmWW6A3qoXXVFXbfbwQ9ZBM8PuZdEuoewF0uCrzCsMwcbEHQavlMQoYnYyyaAsn8OsfydB2eIkW2DT1hWUxb84iqCprlni+STD94uybqBf6KiDDvvF3tLr9JsUZL8J0gNCV7zFIwzdOPoCF3XTXfyeZO34NCi6PtcLGxY8rKsOiooE92NkpOBceMY92ITCizAsnIqyW73iz568XzRkJdl+tuid9Si+hSpgzAalG2zb1QqHdbmcD09P1saP6mUT8AWmYarqiu6MxABgdk6GP29qcss41HVYxV74NNTLqhvmT+t3hw2SR2L2MD8/oZG2qGblyoEfLTsetWvLImDTB82/JuMHG+ZIQesfInQwmLIYFy1wnK/jMI2DpR+yvwqyfpT9EsplL/bBY/oi1u+qB6QU/Z30qo3xIANef+L44Yt2WOU2HEIL0zuCuaCUDtJo75SLTjDohX3WNR2+73z9fs03gzTpAVPMLWOBi8gc2uC2wuCQQjKrmyLQSt8cCamoyOoCyumcAHs6Hfbpj46Ga5wyIiJ3xmjjopBC6VwkZUHtjgjFnNBKWU3J0HGQQkC+X0RQEg+nffKdRmw78sSQ1350SFznlRETniPnSobolNQh7xM97o6JqAwwCFqnlKyUJnpr94uJrpjjtKimAFX8mR4ue2PEgMtl4DxyKlEAMQkrtNsdAxpMnqegnfHOhlzT+bNnDMwW00XT+5bOyJ+nxGaHrJCgVIA8sGRQGyr1civE7kgIhCR04E1wCfOUqG72+0UCVdrTWVMvFz88BD71xBh7bo0C41lufYDAUVp3g+pgI9+5J/XiGULzzQEww2qM7BUMjCavP728oG18kj1t6vnw2Yp99nRyzZBJNipAKk6yf06xwRUGqlhcULc/L7nmK2Ay/hgW3uYyWv9/EL7ajGaec/4rFz2YT05GOA/f3WCDHEBbhIvd0VPY8oKyXhHXdoSe7miI4tHw3hbhA+veT4V+4dORXzHGBLOeaWakQ4cy3iDzRnQRiPIxQKG5y3MSuVUaDAYfLLtu6BRc3tA6SkQFuQGtOUYwnG8VWcwpz1yVBYIlrhGCCBJ5MFqm7bKuNZaZEA1RGQEiWGDecKe3ppprOxSPZrMGZ3Cxr5582yQUTgtMRNTnixKKVffi6bJawZnvkJQCNHHdJ/SjidgcnA32Pi6ai91CuebJfbJ13HFGKkCqDyQakD5a4hBpdzA4xiznEhQXREI0iBj2fO58QfU52TcsN+r4MVZqF1yWy5Y8jvEAmkPin939BOl2y/sjZ+OpsELN2S3X5NwnA0J44yVQ0nUi7rvPso1T7x3OVxX8IbC8xew7AvLmHkOIIgknnFMhBoAonDf3hQ98tn+8dzBvvPG4GZ7LosKjDsIbjKN6h/Xc11+DbHYZ2bcVjjsC7Wf75lRTSi+IHVNxIpRnqPVnCszVfeHTYTIXNvcyBR8wyICeQ+jvFFeIOq4Xz+62ybF/NK8p9/3B+FP77gi7V1s5TmlMTjIneMq9zhmivK+MaEsB9n1Rou3GjpwoUd7gEZU2wANYLTncoBvAOBot0Oo8EDtWCZzdzrDaU1hsoO6CvnZSaBtzLUPInbHbq9FrofU3Qrts8AYePa47StrPKWBYkZZ3jJZb0H8EgOcit7zfu1owjLI/gXYHgGBOS6usAiYTs8FIZPsM2qMZ/t4nrMdFfyEZusNd/5Njv7G7zowxhNY7cJGOfes1l2iYjDdocqWUuGCKMYKCdpCbnG+vn28xhEMpelz/Ue92nbbfwK0rP4aLKQkpGUxgMQcpFPKdrz+GiG26JKiXXbuAgM+hwg3dawpST5ri6vnLetbn5/8BunWeT78mAAA=&quot;"/>
+    <we:property name="creatorSessionId" value="&quot;99a85d7e-51a8-41c9-8416-ef87aa166eb9&quot;"/>
+    <we:property name="creatorTenantId" value="&quot;283ffb50-a30b-488c-90f4-cdae4f7ae6d1&quot;"/>
+    <we:property name="creatorUserId" value="&quot;100320022002D083&quot;"/>
+    <we:property name="datasetId" value="&quot;78e01efd-c0d3-4334-9fc8-7a2e313f1e28&quot;"/>
     <we:property name="embedUrl" value="&quot;/reportEmbed?reportId=2f39f5dc-b270-48fd-90fd-e32fa9530203&amp;config=eyJjbHVzdGVyVXJsIjoiaHR0cHM6Ly9XQUJJLU5PUlRILUVVUk9QRS1KLVBSSU1BUlktcmVkaXJlY3QuYW5hbHlzaXMud2luZG93cy5uZXQiLCJlbWJlZEZlYXR1cmVzIjp7InVzYWdlTWV0cmljc1ZOZXh0Ijp0cnVlLCJkaXNhYmxlQW5ndWxhckpTQm9vdHN0cmFwUmVwb3J0RW1iZWQiOnRydWV9fQ%3D%3D&amp;disableSensitivityBanner=true&amp;lrtl=true&quot;"/>
-    <we:property name="pageName" value="&quot;ReportSection&quot;"/>
-    <we:property name="pageDisplayName" value="&quot;Descriptive&quot;"/>
-    <we:property name="datasetId" value="&quot;78e01efd-c0d3-4334-9fc8-7a2e313f1e28&quot;"/>
-    <we:property name="backgroundColor" value="&quot;#FFFFFF&quot;"/>
-    <we:property name="bookmark" value="&quot;H4sIAAAAAAAAA+1a3U/cOBD/V0770hd0ir/tvhXa3j3cVaigvpyq1dgeL2mzSZRkW7iK//0myaIWWNjeUggq5SmxveP5+Hk8vwlfZjFv6wLO3sASZ89n+1X1cQnNx9/YbG9WXh4zNjJvgnYyRW0FInBDq6q6y6uynT3/MuugWWD3Lm9XUPQCafCf93szKIpDWPRvCYoW92Y1Nm1VQpH/i+NimuqaFZ7vzfC0LqoGepFHHXTYi/1Ey+mdVGG/C9oRQpd/wiMM3Tj6Fuuq6S7e92bt+DSodHmuFzZseFCVHeQlCe7HmDOCc+EZ92ATCi/CsHHKi269xJ+9Oq0bsoesPKt7t7yIn6AMGGeD0g227XqHg6pYLYenV5fGj6pVE/AtpmGq7PLujMQA4OycDD9sKnLLONR1WMZe+DxUq7Ib5k+qzwcNkkfi7Hl2/p5G2rxcFGsHfrXseNSuLfKATR8e/4GMH2xYIoWnf4jQwWBKPW6a4zhfxWEaB0u/zP7KyfpR9jsoVr3YZy/pF7H6XD4jpejvfa/aGA8y4MM3jh9+0Q673IdDaGNaI5gLSukgjfZOuegEg17Yra7p8LTz1ekl3wzSpAdMMbOMBS4ic2iD2wqDAwrJomryQDv9cCSkvCSrcyjmSwLsyXw4kU8dDTc4ZURE5ozRxkUhhdKZSMqC2h0RijmhlbJaROc4SCEgmxYRlK7DSZ9m5xHbjjwx5LWnDombvDJiwnPkXMkQnZI6ZH2ix90xEZUBBkHrlJKV0kRv7bSY6PIlzvNyDlDGX+nhqjdGDLhMBs4jVxgAMQkrtNsdAxpMliUqhYx3NmSa7p+JMbCo53XT+5buyF+3xGaHrJGgVIAssGRQGyr1MivE7kgIhCR0QHWxS5ilFKl6nBYJVGnPF021qp88BL71xBh7bo0C41lmfYDAUVp3h+rAUzIJNibuMHilJEYRH0u9eIbQPCYA7EObh4vo9xStuKBk18S1HXmnOxq0PBrWbRE+sMppKtC1m0d0ScaYYNYzzYx06FDGO2SWiC4CURoGKDR3WUYit0qDweD9VdcNTPgqYHWUiAoyA1pzjGA43yoyX9I5ui4LBEtcIwQRJPJgtEzbZd1oLDMhGirVBYhggXnDnd56lG5k4C8WiwYXcEH5X/3YQxZOckxERJd1Afmanb9elWs48x0OXYAmXvYJvTQRm/2zwd6XeXNxWvjeFbUntnU8cUYqos6YSTQgfbRUI6fdweAYs5xLUFxQka1BxDBxXv2O6mpvalhu1PFrrNQuuCxWLXkc4z40B8SvuscJ0u2W91fOxlthjZqze645uU8GhPDGS6Ck60Scuo+wjTNODufrCj4JLG8x+4GAvJlDhyiScMI5FWIAiMJ581jq3Vv7o5ODeWNH/254LvISjzoIHzGO6h1US1/9H2Szq8i+r3A8EGhv7QtTTSm9IPZHxYlQnqHWtxSY6y9fr4fJTNjMyxR8wCADeg6h/zq2RtRxVb95WBI/PZovKffzwfhb+x4Iu9dbFU5pTE4yJ3jKvM4YonysjGhLAfZzUaLtxo6cKFHe4BGVNsADWC053KEbwDgaLdDqLBA7Vgmc3c6w2hOoN1B3Qb92UmgbMy1DyJyx26vRG6H1N0K7avAOHj2uOkrahxQwLEnLB0bLPeg/AsBzkVnen10tGEbZ30C7A0Awp6VVVgGTidlgJLIpg/ZigX/0Cetl3n9wC93Brv+pMG3sbjJjDKH1Dlyka996zSUaJuMdmlwpJS6YYoygoB1kJuPb6+d7DOFQih5Xf1a7fS6aNnCXlR/DxZSElAwmsJiBFAr5zu39IWKbmuDVqmtrCHgIJW7oXlOQetIU18/f17M+P/8PSySY54klAAA=&quot;"/>
     <we:property name="initialStateBookmark" value="&quot;H4sIAAAAAAAAA+1a3W/bNhD/Vwa/7CUYxG+yb0mabkDXNmiCvgyFcSSPjlpZMiS5TVbkf99JctYmcaLNaeKgqZ8kUjrex4/H+538ZRLzZlHA2WuY4+TZZK+qPs6h/vgLm+xMytXYmzcvX+2+fTl9vfvqgIarRZtXZTN59mXSQj3D9l3eLKHoJNDgX+93JlAUhzDr7hIUDe5MFlg3VQlF/jcOD9NUWy/xfGeCp4uiqqETedRCi53YT/Q43dPa7DdBK0Jo8094hKEdRt/ioqrbi/udSTNc9SpdnuuE9QvuV2ULeUmCuzHmjOBceMY92ITCi9AvnPKiXT3izw5OFzXZQ1aeLTo/7MZPUAaMk17pGptmtcJ+VSzn/dXBpfGjalkHfIupnyrbvD0jMQA4OSfDD+uK3DIMtS2WsRM+DdWybPv5k+rzfo3kkTh5lp2/p5EmL2fFyoFfLTsetGuKPGDdhcd/ION7G+ZI4ekuIrTQm7IYFs1xmK9iP429pV8mf+Zk/SD7HRTLTuyvz+mNWH0ufyWl6Pe+U22IBxnw4RvH9280/Sr34RBamJ4RzAWldJBGe6dcdIJBJ+xW17R42vrq9JJvemnSA6aYWcYCF5E5tMGNwmCfQjKr6jzQSt8dCSkvyeociumcAHsy7bfgU0fDDU4ZEJE5Y7RxUUihdCaSsqA2R4RiTmilrBbROQ5SCMi2iwjKz+GkS7PTiE1Lnujz2lOHxE1eGTDhOXKuZIhOSR2yLtHj5piIygCDoHVKyUppord2u5ho8zlO83IKUMaf6eGqNwYMuEwGziNXGAAxCSu02xwDGkyWpaCd8c6GTNP5s2UMzBbTRd35ls7In6fEeoeskKBUgCywZFAbKvUyK8TmSAiEJHTgTXAJs5QiVY/bRQJV2tNZXS0XTx4C33piiD23RoHxLLM+QOAorbtDdeApmQQbE3cYvFISo4iPpV48Q6gfEwD2oMnDRfQ7ilZcULJr4pqWvNMe9Voe9c+NCO9Z5XYq0JWbB3RJxphg1jPNjHToUMY7ZJaILgJRGgYoNHdZRiJHpUFv8N6ybXsmfBWwOkpEBZkBrTlGMJyPiszntI+uywLBEtcIQQSJPBgt07isG41lJkRDpboAESwwb7jTo1vpRga+O5vVOIMLyn/wfTdZOMkxERGdLwrIV+z8xbJcwZlvsOkC1PGyT+imjljvnfX2Ps/ri93Cd66ovWVbhx1npCLqjJlEA9JHSzVy2hwMjjHLuQTFBRXZGkQMW86r/6G62tk2LNfq+DVWahNcFsuGPI5xD+p94lft4wTpuOXdkbP2VFih5uyea07ukwEhvPESKOk6EbfdRxjjjFuH83UFnwSWR8x+ICCv59AhiiSccE6FGACicN48lnr31v7o1sG8tqN/NzwXeYlHLYSPGAf19qu5r/4PstlVZN9XOB4ItLf2hammlF4Q+6PiRCjPUOtbCszVp64X/WQmbOZlCj5gkAE9h9B9Dlsh6rhavH5YEr99NF9S7seD8bf2PRB2r7cqnNKYnGRO8JR5nTFE+VgZ0UgB9mNRonFjB06UKG/wiEob4AGslhzu0A1gHI0WaHUWiB2rBM6OM6zmBBZrqLugt50U2sZMyxAyZ+x4NXojtF4hNMsa7+DR46qlpH1IAcOStHxgtNyD/gMAPBeZ5d3e1YJhlN0JtDkABHNaWmUVMJmYDUYi22bQdmf4e5ewnufdB7fQ7m/6T4Xtxu4mM4YQWu/ARTr2rddcomEy3qHJlVLiginGCAraQWYyPl4/32MI+1L0uPqj2uxz0XYDd1n5IVxMSUjJYAKLGUihkG/c3u8jtq4JXi3bZgEBD6HENd1rClJHmuLqerRnvdNpk/tirIPe/T/q3x73+fk/HHq26aolAAA=&quot;"/>
     <we:property name="isFiltersActionButtonVisible" value="true"/>
     <we:property name="isVisualContainerHeaderHidden" value="false"/>
+    <we:property name="pageDisplayName" value="&quot;Descriptive&quot;"/>
+    <we:property name="pageName" value="&quot;ReportSection&quot;"/>
+    <we:property name="pptInsertionSessionID" value="&quot;E80A8102-2D23-4D32-9236-2AF6E191FD70&quot;"/>
     <we:property name="reportEmbeddedTime" value="&quot;2024-03-09T02:34:02.499Z&quot;"/>
-    <we:property name="creatorTenantId" value="&quot;283ffb50-a30b-488c-90f4-cdae4f7ae6d1&quot;"/>
-    <we:property name="creatorUserId" value="&quot;100320022002D083&quot;"/>
-    <we:property name="creatorSessionId" value="&quot;99a85d7e-51a8-41c9-8416-ef87aa166eb9&quot;"/>
-    <we:property name="artifactViewState" value="&quot;live&quot;"/>
+    <we:property name="reportName" value="&quot;NHS NECSU&quot;"/>
+    <we:property name="reportState" value="&quot;CONNECTED&quot;"/>
+    <we:property name="reportUrl" value="&quot;/groups/me/reports/2f39f5dc-b270-48fd-90fd-e32fa9530203/ReportSection?bookmarkGuid=299daa71-4d56-4dc7-95ed-fdc89d09c24e&amp;bookmarkUsage=1&amp;ctid=283ffb50-a30b-488c-90f4-cdae4f7ae6d1&amp;fromEntryPoint=export&quot;"/>
   </we:properties>
   <we:bindings/>
   <we:snapshot xmlns:r="http://schemas.openxmlformats.org/officeDocument/2006/relationships"/>
@@ -5566,29 +6708,29 @@
 </file>
 
 <file path=ppt/webextensions/webextension2.xml><?xml version="1.0" encoding="utf-8"?>
-<we:webextension xmlns:we="http://schemas.microsoft.com/office/webextensions/webextension/2010/11" id="{47D351F8-D7B1-463D-AA09-818EE10AADE1}">
+<we:webextension xmlns:we="http://schemas.microsoft.com/office/webextensions/webextension/2010/11" id="{26CEB6E1-E523-4BFB-AA7A-832F5DE54A97}">
   <we:reference id="wa200003233" version="2.0.0.3" store="en-US" storeType="OMEX"/>
   <we:alternateReferences>
     <we:reference id="WA200003233" version="2.0.0.3" store="WA200003233" storeType="OMEX"/>
   </we:alternateReferences>
   <we:properties>
-    <we:property name="pptInsertionSessionID" value="&quot;E80A8102-2D23-4D32-9236-2AF6E191FD70&quot;"/>
-    <we:property name="reportUrl" value="&quot;/groups/me/reports/2f39f5dc-b270-48fd-90fd-e32fa9530203/ReportSectione605358c5922f8f096d7?bookmarkGuid=461c620e-385b-4661-a85c-d3b1fb7e7cbe&amp;bookmarkUsage=1&amp;ctid=283ffb50-a30b-488c-90f4-cdae4f7ae6d1&amp;fromEntryPoint=export&quot;"/>
+    <we:property name="pptInsertionSessionID" value="&quot;DB996B06-8133-4719-95CB-54381B0371CD&quot;"/>
+    <we:property name="reportUrl" value="&quot;/groups/me/reports/63f8b361-5823-4ed2-86cd-023a9d331921/ReportSection?bookmarkGuid=4f0153d1-1e11-4871-8f70-d045a89c628a&amp;bookmarkUsage=1&amp;ctid=5bd29425-66cf-41af-9e85-d00363dee683&amp;fromEntryPoint=export&quot;"/>
     <we:property name="reportName" value="&quot;NHS NECSU&quot;"/>
     <we:property name="reportState" value="&quot;CONNECTED&quot;"/>
-    <we:property name="embedUrl" value="&quot;/reportEmbed?reportId=2f39f5dc-b270-48fd-90fd-e32fa9530203&amp;config=eyJjbHVzdGVyVXJsIjoiaHR0cHM6Ly9XQUJJLU5PUlRILUVVUk9QRS1KLVBSSU1BUlktcmVkaXJlY3QuYW5hbHlzaXMud2luZG93cy5uZXQiLCJlbWJlZEZlYXR1cmVzIjp7InVzYWdlTWV0cmljc1ZOZXh0Ijp0cnVlLCJkaXNhYmxlQW5ndWxhckpTQm9vdHN0cmFwUmVwb3J0RW1iZWQiOnRydWV9fQ%3D%3D&amp;disableSensitivityBanner=true&amp;lrtl=true&quot;"/>
-    <we:property name="pageName" value="&quot;ReportSectione605358c5922f8f096d7&quot;"/>
-    <we:property name="pageDisplayName" value="&quot;Questions Answered&quot;"/>
-    <we:property name="datasetId" value="&quot;78e01efd-c0d3-4334-9fc8-7a2e313f1e28&quot;"/>
+    <we:property name="embedUrl" value="&quot;/reportEmbed?reportId=63f8b361-5823-4ed2-86cd-023a9d331921&amp;config=eyJjbHVzdGVyVXJsIjoiaHR0cHM6Ly9XQUJJLVVLLVNPVVRILUItUFJJTUFSWS1yZWRpcmVjdC5hbmFseXNpcy53aW5kb3dzLm5ldCIsImVtYmVkRmVhdHVyZXMiOnsidXNhZ2VNZXRyaWNzVk5leHQiOnRydWV9fQ%3D%3D&amp;disableSensitivityBanner=true&quot;"/>
+    <we:property name="pageName" value="&quot;ReportSection&quot;"/>
+    <we:property name="pageDisplayName" value="&quot;Exploratory&quot;"/>
+    <we:property name="datasetId" value="&quot;bdc5bdd0-9d5f-40dd-8e48-e5bc76ac928e&quot;"/>
     <we:property name="backgroundColor" value="&quot;#FFFFFF&quot;"/>
-    <we:property name="bookmark" value="&quot;H4sIAAAAAAAAA+1aS3PbNhD+KxlectF0QJAAydxsJWk6kyZu7CaHTkaDx1JiQpEsCbpWPfrvXYCSH7LetmVPk1wiEMDi291vd/HwpaezpsrF5IMYg/fKOy7L72NRf3/hez2vuP0tpDFjoVaUkUAmQajCIMZRZWWysmi8V5eeEfUQzOesaUVuBeLHv772PJHnJ2JoW6nIG+h5FdRNWYg8+xe6wdhl6hamPQ8uqryshRV5aoQBK/Ych2Mbofi/BLiiUCY7h1NQpvv6CaqyNrM2cMICFiuWUJrGKUm4jnBO0/U6mJvH20UdsH5ZGJEVCMB+CwmJhQhVIBkwTkRAhLTf0yw3syFyZslL7637GCnJmeQ00RKYDIIkpNT2zmy7ZlDPM5PKjjkrqw/Y6haxcz/P7UF73tu6HKOVL72ZA5tW/t1CPcEJby6qGppu5KV3Ou/A33/Mf6yTJKyIwmRmYhsCsHnmAJEp+vQUcrSfG98v83bs1lhYsWxrBZ8gvW44sVN080ldIgmcaDXKIB2ocow0zArjYe8MQZpBrj272sdaQ308ccu9zuq55+mikr+DaNoa9sbSL9vCDPoOUf8a0dRiQDd4r4KpndHZgU57WxrrywgsKGerQmdmBuq3BaM1j2JOh13IHFYLuSLN1P772oXhjaW3gnRL/Y2get6o/KdfA4a4tlbCD3JipTsbzJh/pM9FoXDAIqDt/LwO0SpPL+KyxmiyYpjPMtV1auj86+myaE1/JGpjc6H8hty0iQCnlQ9K2n2Usa7vkiUO/nYjA/ZRvWFZT7Yn3G7e/erCxA+45qEmNEhIwBQJuBJW1lp7Grgwsry4bUwrjfmpVESksVSYraX0pVB3ku8ig2aKZgpXenBWD6tBVVv7Khi4fL4HfZocZ9e3tPXGgGXU/tDCCKdN1S2aQddfatcNTtlL732GBuhkfxZ5a8W+PBZNpl7OA3q6ggdu+A5pZ0drdDRAt9PQ51HsRzHyIAIi4400aEaigrskkKGfBH5M4oiCVkgHwfwNFRhSqpkfJywM8T8s3gEJ71TgpYN+lAos6jo7F/nA8eo+5fdoOKxhKOb17c3u4bYtSOx72xYzHOxGgWbPvkAvKPIMqvMd096nNN+fAztBvcWCnbOvytvGRr8+FvW9avhTan2gKr/IWxdoOvAVA0LCIKEJ5mOiKd+Yj30ayojxMCbc1wpIwpbk4yWDfpR8jEdyNbJH6YGGxmRFR6vnmphXoF2ZoZ//EWqVRs8gVa829tMep17Pcb2+huVOJfvsieU9k/HjqnOgdLuShC58BBFKS58wwsLIF0Qn3a3VWrsKh/W4NQYl3dlaC6kYS4EGEWZ0jXvsRLKNIrOxGC7ZpkOccB1EjNAk5kRQSUmw8az2P8/qP++5ft5z+daUB8zGg7Ny8K4cw2B5Lr4J51FvSjBJDIZ12VZLysEWFjmqMzMag8nchc97SM3j2+lTNhy5ZU4Vjtdvzrvs92iVZgkEt7J9QrGNjzhDmLJ2sbn/Qadz5S7l1V9MPg/KhkMdXm4s2VXQRCaRpH7ItT20qAir6D0uJ4nSXCYhHoUoCzinNAzFxoJ3cL6fzO/n2OAEcEph0C7IhWIIh+T8Jhjb8v5A2XQT3F1DUdT66Xa265XproopJNwPYhZJEnOpBCew+cJ2ZWiogDGuGG4nlc8kpUzGdP/QeAAL4E4a1W7+LNDm4Tuc1nzBcDtu62UHqefuzrXKdO4EmoiIgB8nJEIRKoLu1Xo/d1IpaeLzJA4kJIpLP9Z3t/a3b3ySyCeggjTmHBTjgjLtANy68Vk6qHcIPlyFwfHkaAi/Lt2m+I97oq5amWfqxfWZz5SDUTleg/Vq33BWviv3e3o6IHMfQr+OzDGPwiAItQ7x+CuZ4kn3mrMfmSMSCBpwKolSnEURUX78lLlp24378/LuTop0bgzTJJYkUomOQWhGItyIHczwP6Nt62ijIRFRmGLJJlJGJIYw2TfaXMAte+UuW9NUQsGJKGDJaze6WmB107Pfq1683Z+WXb13T6f/AeBC04faJgAA&quot;"/>
-    <we:property name="initialStateBookmark" value="&quot;H4sIAAAAAAAAA+1aWXPbNhD+Kxm+9EXTAUECJPNmK07TyWHXdpOHTkaDYykxoUiVBF2rHv33LkDJh6zbtuxp4hcT157f7uLQlaezepSL8ScxBO+1d1iW34ei+v7K9zpeMe07Pn7/8eD0fe/Twccj7C5HJiuL2nt95RlR9cF8zupG5JYCdv71teOJPD8RfdtKRV5DxxtBVZeFyLN/oZ2MQ6ZqYNLx4HKUl5WwJM+MMGDJXuB0bCNv/9cAOQplsgs4A2Xa3lMYlZWZtoETFrBYsYTSNE5JwnWEa+p21Im5fr5l6gTrloURWYEC2L6QkFiIUAWSAeNEBERI259muZlOkVPTXXlvXWekJGeS00RLYDIIkpBSOzo15opJHc+MR3bOeTn6hK2WiV37eWYP2vHeVuUQrXzlTT1WN/LvBqoxLji6HFVQtzOvvLPZAH7/MftYRUlYEoXJzNg2BGDz3AlEJujTM8jRfm5+t8yboeMxx7FsKgWnkN40HNkJuvmkKhEEjrQaZJD2VDlE3GWF8XB0KkGaQa49y+240lAdjh27N1k18zydV/IjiLqpYGdZumVTmF7XSdS9kWhiZUA3eK+DiV3R2oFOOhsa68sArFDOVoXOzFSo3+eMVj+JOZ3sQuawnMg1aCb272sbhrdYbyTSHfXXCtXxBuU/3QowxLW1EnbIsaXubDBF/oG+EIXCCfMCbebnVRIt8/S8XNYYdVb082mmukkNrX89XRaN6Q5EZWwulN8QmzYR4LLyUUG7izLW9W2yxMnfbmXALqrXL6vx5oDbzrtfXZj4Adc81IQGCQmYIgFXwtJaaU8Dl0aWl3eNaakxP5WKiDSWCrO1lL4U6l7ynUfQVNFMIadHR3V/1BtV1r4Kei6f7wCfOsfV1R1tvSFgGbUfWhjhtBm1TDNox0vthsEpe+V9yNAALe3PIm8s2V8ORZ2pX2YBPVmCAzd9i7SzpTVaGKDbaejzKPajGHEQAZHxWhjUAzGC+yCQoZ8EfkziiIJWCAfB/DUVGFKqmR8nLAzxHxbvgIT3KvDCST9KBRZVlV2IvOdw9ZDye9DvV9AXs/p2tH24bSokjr1tiqkc7FaBZi++QM8p8gKq8z3TPqQ0PxwDW4l6BwVbZ1+VN7WNfn0oqgfV8OfUek9Vfh63LtB04CsGhIRBQhPMx0RTvjYf+zSUEeNhTLivFZCELcjHCyb9KPkYz+BqYI/SPQ21yYoWVi81MS+RdmmGfvlHqGUavYBUvdzYz3ucejOT682NWO5UssueWD4wGT+tOntKt0tB6MJHEKG09AkjLIx8QXTS3lqttKtwsh42xiCle1trIRVjKdAgwoyucY+dSLaWZDYU/QXbdIgTroOIEZrEnAgqKQnWntX+51n95z3Xz3su35pyj9m4d1723pVD6C3OxbfFedKbEkwSvX5VNqMF5WADixxUmRkMwWTuwucDpObp7XSa9QeOzZnC+froos1+T1ZpFojgONsnFNs4xhXClJWLzd0POq0rtymv/nzyeVQ07OvwcotlW0ETmUSS+iHX9tCiIqyiD7icJEpzmYR4FKIs4JzSMBRrC97e8X4yu59jvRPAJYVBuyAWij7sE/PrxNgU93vKpuvE3TYURaWfb2e7Wpn2qphCwv0gZpEkMZdKcALrL2yXhoYKGOOK4XZS+UxSymRMdw+NR7AA7qRR7frPAm0evsNl9RcMt8OmWnSQeunuXKlM606giYgI+HFCIiShImhfrXdzJ5WSJj5P4kBCorj0Y31/a3/3xieJfAIqSGPOQTEuKNNOgDs3PgsndfaBh+swOBwf9OG3hdsU/2lP1KNG5pl6dXPmM2VvUA5XyHq9bzgv35W7PT3tEbmPoV8L5phHYRCEWod4/JVM8aR9zdkNzBEJBA04lUQpzqKIKD9+zty06cb9ZXl3K0VaN4ZpEksSqUTHIDQjEW7E9mb4n9G2cbTRkIgoTLFkEykjEkOY7BptLuAWvXKXjalHQsGJKGDBaze6WmB109PvZS/e7qdlnmOC0mTTe4AVC+wPzq7fxyeT/wAVHb87+yYAAA==&quot;"/>
+    <we:property name="bookmark" value="&quot;H4sIAAAAAAAAA+VZS2/bRhD+KwUvuRjFvh+5xU7SHtrAiI1cCkOY3Z2VmVCkQFKJ3UD/vUtSrmtLMlPZsZz4ZHNnOTuPj7PfjL5mIW/mBVy+gxlmL7PDqvo0g/rTLzQ7yMphjSrGiKRROC+ZIUQbCElazdu8Kpvs5deshXqK7Ye8WUDRKUqLf50dZFAUxzDtniIUDR5kc6ybqoQi/xuHzUnU1gtcHmR4MS+qGjqVJy202Kn9nLan586EX3k6EXybf8YT9O2w+h7nVd1ePR9kzfBfb9JNWaesP/CoKlvIy6S4W6NSQIwaIxgkILhEJrv1Ji+nxcrE63dPL+ddOFq8aF110UXAfUz6O03LZXIhxsg4lZQK6pQFognT3dsxL9rVge7yzcW8TtFJMRu0vQqfofTYBTSFoMamWdn7J0KzqPs4vLkhOKkWtcf3GHtR2ebtZdIDgFlnxHFdpSj3S75alO1p9Xs1G0Tn1ZejGlNsQ/aSLM/Syp1+eqjDTSfTQx2wPrzsHXid11fRZQe3bHxo45O1SWycBRvQC+MUE6ipCGz3dHFqlTDSSKAiUuO1QLrPdL2a4m91tZi/zps2L3171EXgx0vcNjeGFDrGiWHEKaI4xZC+FOHukcII1gquTCBKeE+sNmSfKTytWigmx6mKYZms/OFyt2b/kDTKUCuORhFPnZYp6CaOJq05h/R3vUgSblhAqTQwD0YJBnx3AFipMFpBLWexAxVFFLsD4NV0WuMUrm6Mm0E8qorFbMP6Nwd3Op/M6+4K8zjpb9ZO/nZRXqXzkdGyb2cHaEFXALiWEEzg0lFUSm1P4IqQvO2FCUjEieidTzeCR8fAd6RlleTTav5uLcH3diuxmcm0q24bvu2DfQPspnHXwZY7IKtIHCnxMP8Jw2DXUTVz1dE51O03Ao7eBtyD+rc8u6KDacPH//C+o+TitKoHcx70yLO+4vjAI7fcWumDBwjcunGStzIq9ynSD47JmJcJbXkq3LNEbs+vP7enBs+2xTJ0J0/8v9Tm50PplnQ8EmC3nD5gl7mogXOnnQDQzPIA43Tpu2K3zWc4ycsJQBmeJGjXDbwfYn2xaFKsMRxC/X9w+sjX94jbjwTm21YMKLaUGsYESMZVjAp48GG/KN5Idp4YkEcI2U+M5XHPHwnOGwwZEK2FBIxIBGoQLjFhqcf7q609EdU+aAOSA/cm8etU6O+g1PtFpT/PMSY6MJsXkK9Rgp+rJRr1ddURcRqZQvDcC2ReKxHvMeRyKghECUSDUgxDuvbHteWzxHvXdQW0AWywFJArZgkRFkd1Qe/f4aJt+xHtLZWCUsqpcVRRnbRZFOEe0wAn0XsTIrPonZQCA9/zzXBNxy4R6l0GQk2RykV9w9dshvW0j3yAFnpf5sOROQ7yKvRi7F39mv2RJ/cH3R+gWHRqXxxCk/sXHTHty1+DxdVnsaauaVN02pPeypN+34jyftq/Ut1DelNt7Tc3D816V2Fe8V2jJWhHiXEePENh7D3G+54bjhac9jbV6hgDcrdfdN01jdgbsF6nN0L1pXzxmABY79OtlB6Ip1Gj0txxYvg9KosCTUj0ympnjSdKaGWePOd8XhDYyq4sEZ6xwNLlAIgxfcXK7o6ExM2Aglep9YhGCB2c2TMSxnro5wWDzT2jY8iYFD5YKZQnjDs6Tl22YkBSy5WURvFgLQPB+b7nKCFv/Hn3I/wkYPez28BhnzsWtkVlwASxWittAxdcKsKjTD3T7pgQLrVwgRhKPeOBWjTePhXueedc+HlB4s75KKfWS6l8ut2dlanT4RR2RwS1mrOu0jAHJiayyD2OImJrH/59xu/PGQobAnLWH7/c7F+1aJs5eDyGEjf4mfzrrpww4uvN3mi5/AeZZi+ZgSUAAA==&quot;"/>
+    <we:property name="initialStateBookmark" value="&quot;H4sIAAAAAAAAA+Va32/bNhD+Vwa99CUYxN9k35K03YCuXdEEfRkC40geHbWyZEh0m6zI/z5KcpYltqPOSeO0eUpE0se77z4dv6P9NfNFOy/h/C3MMHueHdT1pxk0n34h2V5WLcf+/PP1m/33rydv99+8TMP1PBZ11WbPv2YRminGD0W7gLKzkAb/OtnLoCzfwbR7ClC2uJfNsWnrCsribxwWp6nYLPBiL8OzeVk30Jk8ihCxM/s5LU/PaW/yK0s7govFZzxCF4fR9zivm3j5vJe1w3+9S9fnOmP9hod1FaGokuFujAgOISgMoDEHzgRS0Y23RTUtly5effb4fN7hEPEs2vqsQ8B+TPY7SxcXKYQQAmVEEMKJlQZylVPVfToUZVxuaM9fns2bhE7CbLC27z9D5dBnPQQNtu3S3zcI7aLpcXh5beKoXjQO32Pop6pYxPNkBwCzzol3TZ1Q7odcvajicf17PRumTusvhw0mbH32PL84SSO3xumg8deDTA+Nx+bgvA/gRdFcokv3bvh4384nb9O0tgaMR8e1lZSjItzT7dPFiJFcCy2A8EC0UxzJLtO1P8Xfmnoxf1G0sahcPOwQ+PEStymMIYWWslzT3MpcMoI+vSnc3iGFAYzhTGqfS+5cbpTOd5nC4zpCOXmXqhhWycsfLncr/g9JIxSVZKhl7ohVIoGuw2jS2lNIf1eLZM409SikAupAS06BbU8AIyQGw4lhNHSkIoh8ewLsT6cNTuHyxLgO4mFdLmZrxr8Z3Ol8Mm+6I8zhpD9Su/lXi+oynQ/Mll0HO1ALugLAlACvPROWoJRycwKXSuRVP5mIlFsenHXpRHBoKbhOrSyTfFzP364k+M5hJTUzmXbVbc27vbdrgl137gpssQWzyqSRkg5zn9APfh3WM1sfnkITv5Fw5Cbh7jW+i5NLOZgWfPyP7jtMIU7rZnDnXrc86SuO8ywww4wRzjsAz4wdF3lLpwqXkL53ToaiSmwrUuGeJXF7evW6PTZ6xoiV73aeuH+lzc/H0g3peCDCbth94C61QQFjVlkOoKhhHsbl0nflbixmOCmqCUDlHyVpVx28G2NduWgT1ugPoPk/PH3g43sk7Aci800vBhYbQjSlHARlMgQJzDu/WxavFTuPjMgjguwn5vJ45A9E5zWODIxWXAAGzDkq4DYpYaHG+6uNPRFRzisNggFzOunrVOhvkdS7ZaU7LTAkOTCbl1CsSIKfqyUajXXZETESqERwzHGkTkke7nDJZaXniAJyBVJS9OnYH7dWzJLuXbXl0Xgw3hBAJqnJc25w1Bb08R0sYuyvaG+Y5IQQRrQlkqhkzSD3d7gNsAKd0z5Qg84KwdGzHZ8MV3LsHKHZ5kKoLVO5aK7Fms2wmfbIe4jQxzIftixwmK99P419qF+zP4oU/mD7A5SLzuyzA2gL96wTpn35a7G8fC1WzLUxoROPei+P+nUjxvvb/qXpntLramu/uL1v1buEeal3tRKgLMm1deAocm3ucL3vmGZowCpnUq0OwSOzu2XXbbcROyPWi/QJX3+pnj0kAVb7dCOEg9yRoFAqZlmu2R0qiwSV58FJo6zRLpdcSf3oNefTosBGdWVy7ij1NB0OgBjSWyzN9kxI2gwIOJlaj6A5V97qHTNhrId+WjRY3zNaipQK7rwRXLqcMkvGpctGDghimBRCS+aNocAZ2/U9ii9ad9p9CT/x2H3tNmjYp86FTagMnMiNUlIZzzgTMmdBpJ5pe05wm1o4n2tCHGWeGNTOPBbteeu98NOixK33o4wYJ4R06XS3RqROhxHYnhHEKEa7SkMt6JDEInM4yoiNffj3uX5/ylRYA8hJv/3F+vjqRWzn4PAdVLgmzhRfd+T4kVi7nztl/R4J2cKWY9hcrl869w/K4dRtqSUAAA==&quot;"/>
     <we:property name="isFiltersActionButtonVisible" value="true"/>
     <we:property name="isVisualContainerHeaderHidden" value="false"/>
-    <we:property name="reportEmbeddedTime" value="&quot;2024-03-09T02:34:44.140Z&quot;"/>
-    <we:property name="creatorTenantId" value="&quot;283ffb50-a30b-488c-90f4-cdae4f7ae6d1&quot;"/>
-    <we:property name="creatorUserId" value="&quot;100320022002D083&quot;"/>
-    <we:property name="creatorSessionId" value="&quot;332b559d-9064-4bc3-a1ca-7f283afbce71&quot;"/>
+    <we:property name="reportEmbeddedTime" value="&quot;2024-06-04T00:23:39.237Z&quot;"/>
+    <we:property name="creatorTenantId" value="&quot;5bd29425-66cf-41af-9e85-d00363dee683&quot;"/>
+    <we:property name="creatorUserId" value="&quot;10032002B7893BC0&quot;"/>
+    <we:property name="creatorSessionId" value="&quot;f1af5fd7-b353-407a-b998-dbd677ab7516&quot;"/>
     <we:property name="artifactViewState" value="&quot;live&quot;"/>
   </we:properties>
   <we:bindings/>
@@ -5597,29 +6739,153 @@
 </file>
 
 <file path=ppt/webextensions/webextension3.xml><?xml version="1.0" encoding="utf-8"?>
+<we:webextension xmlns:we="http://schemas.microsoft.com/office/webextensions/webextension/2010/11" id="{47D351F8-D7B1-463D-AA09-818EE10AADE1}">
+  <we:reference id="wa200003233" version="2.0.0.3" store="en-US" storeType="OMEX"/>
+  <we:alternateReferences>
+    <we:reference id="WA200003233" version="2.0.0.3" store="WA200003233" storeType="OMEX"/>
+  </we:alternateReferences>
+  <we:properties>
+    <we:property name="artifactViewState" value="&quot;live&quot;"/>
+    <we:property name="backgroundColor" value="&quot;#FFFFFF&quot;"/>
+    <we:property name="bookmark" value="&quot;H4sIAAAAAAAAA+1aW1PbOBT+K4xf+pLZkWVLtvsG6W1nul22sO3DDpPR5Thx69hZW2bJMvnveyQnQIJDQoDAbMsLtizpfOf26UjKpaezepKL6ScxBu+1d1SW38ei+n7gez2vWG5jSjE/oZGiMkqDkLE4AuxVTkxWFrX3+tIzohqC+ZLVjcjthNj4l0eU5jIJGRDKAs4pDUPhnfU8kefHYmj7pCKvoedNoKrLQuTZv9BOgZ9M1cCs58HFJC8rYQWdGGHACjvH7viOAP1fAsQhlMnO4QSUaVs/w6SszPwdOGEBixVLKE3jlCRcRzimbr868Jv7W6EOWL8sjMgKBGDbQkJiIUIVSAaMExEQIW17muVm3kXO7XvpvXONkZKcSU4TLYHJIEhCSu3XucXv6NTzzHRi+5yWk0/41gqxY78s7EF73ruqHKPtL725W+tG/t1ANcUBby8mFdRtz0vvZPEBn/9YPNw1k7BTFCYzU/sibACcOkBkhj49gRzt5/r3y7wZOxkrEsumUvAZ0usXN+0M3XxclRgEbmo1yiAdqHKMwZkVxsOvcwRpBrn2rLTfKw3V0dSJe5NVC8/TVSV/A1E3FeyMpV82hRn0HaL+NaKZxYBu8F4HMzuitQOd9bY01tcRWFDOVoXOzBzUrytGq5/EnA67kDmsn+QqaGb276xNwxuit4K0pP5GUD1vVP7TrwBTXFsrYYOc2tmdDeaRf6jPRaGwwyqg7fx8F6J1nl7FZY1RZ8UwnzPVNTW0/vV0WTSmPxKVsQwpv2FsWiLAYeWjBu0uyljXt2SJnb/dYMA+qjcsq+n2AXc/7565NPEDrnmoCQ0SEjBFAq6EnetOexq4MLK8WDamnY35qVREpLFUyNZS+lKoW+S7GkFzRTOFkh49qoeTwaSy9lUwcHy+Q/jUOY6ulrT1xoCLq30YAq48dhAqNGnlZlBfK738tDuZ75OfOoyGCL6IvHFFBAr4mJlW68u2GQe9en98cDwfdeC/smPOZm2Y2dFaGNFhpHGpnRnBBUX3xEeiztSrBfHN1uTLFbyniZo2XTA9aOjzKPajGPMlAiLjjelSj8QEbieLDP0k8GMSRxS0wrQRzN9QqUBKNfPjhIUh/sMiJyDhrUqls9OPUqmIqsrORT5wcfWQMuVwOKxgKBZ59vb+tLQtSPz2rinmONiNQoa9+EJmRZEXUMXcMu1DSpiHx8C9oC5Fwb1XKZU3tc1+fSSqB9U6z6n1nqqh1bh1iaYDX+G+mIRBQhPkY6Ip38jHPg1lxHgYE+5rBSRhHXzc0elH4WOd1WpkDyIGGmqTFW1YvVRiXoN2LUO//K3mOo1eAFWvN/bzbjvfLHC9uYbldm+77B3kA8n4adXZE92uDUKXPoIIpaVPGGFh5Auik/Z07067Cof1qDEGZ7pVWgupGEuBBhEyusYaO5Fs45TZWAw7ynSIE66DiBGaxJwIKikJNu5p/+es/vM88Od5oG9NuUc2HpyWgw/lGAbdXHwTzpOeKCFJDIZV2Uw6loMtLHJYZWY0BpO5g7GPkJqnt9PnbDhyYk4U9tdvz1v2e7KVpgOCk4y54s5vfscRwpSVy83dNzqtK++zvPqr5POo0bCvzcsNke0KmsgkktQPubabFhXhKvqAQ9zOK8JNC97e431x1Dhgg2PAIYVBu2AsFEPYZ8xvgrFt3O+JTTfBvW8qiko/X2V7tzLtUTGFhPtBzCJJYi6V4AQ2H9iuTQ0VMMYVw3JS+UxSymRMd0+NR7AAVtKodv1ngTYPP+Cw+ium21FTdW2kXro771SmdSfQREQE/DghEU6hImhv93dzJ5WSJj5P4kBCorj0Y327tF8+8Ukin4AK0phzUIwLyrQDsHTi09mpt494uEqDo+nhEN53lin+0+6oJ43MM3Vwvecz5WBUju/AelU3nJYfyt2u6PYYuY+hXxvMMY/CIAi1DnH7K5niSXubs1swRyQQNOBUEqU4iyKi/Pg5uWnbwv1lefdeirRuDNMkliRSiY5BaEYiLMT2Zvif2bZ1ttGQiChMcckmUkYkhjDZNdtcwnX9GqBsTD0RCo5FAR233ehqgaubnj+vu/F2P8G7uu+ezf4D2GL49RgoAAA=&quot;"/>
+    <we:property name="creatorSessionId" value="&quot;332b559d-9064-4bc3-a1ca-7f283afbce71&quot;"/>
+    <we:property name="creatorTenantId" value="&quot;283ffb50-a30b-488c-90f4-cdae4f7ae6d1&quot;"/>
+    <we:property name="creatorUserId" value="&quot;100320022002D083&quot;"/>
+    <we:property name="datasetId" value="&quot;78e01efd-c0d3-4334-9fc8-7a2e313f1e28&quot;"/>
+    <we:property name="embedUrl" value="&quot;/reportEmbed?reportId=2f39f5dc-b270-48fd-90fd-e32fa9530203&amp;config=eyJjbHVzdGVyVXJsIjoiaHR0cHM6Ly9XQUJJLU5PUlRILUVVUk9QRS1KLVBSSU1BUlktcmVkaXJlY3QuYW5hbHlzaXMud2luZG93cy5uZXQiLCJlbWJlZEZlYXR1cmVzIjp7InVzYWdlTWV0cmljc1ZOZXh0Ijp0cnVlLCJkaXNhYmxlQW5ndWxhckpTQm9vdHN0cmFwUmVwb3J0RW1iZWQiOnRydWV9fQ%3D%3D&amp;disableSensitivityBanner=true&amp;lrtl=true&quot;"/>
+    <we:property name="initialStateBookmark" value="&quot;H4sIAAAAAAAAA+1aWXPbNhD+Kxm+9EXTAUECJPNmK07TyWHXdpOHTkaDYykxoUiVBF2rHv33LkDJh6zbtuxp4hcT157f7uLQlaezepSL8ScxBO+1d1iW34ei+v7K9zpeMe07Pn7/8eD0fe/Twccj7C5HJiuL2nt95RlR9cF8zupG5JYCdv71teOJPD8RfdtKRV5DxxtBVZeFyLN/oZ2MQ6ZqYNLx4HKUl5WwJM+MMGDJXuB0bCNv/9cAOQplsgs4A2Xa3lMYlZWZtoETFrBYsYTSNE5JwnWEa+p21Im5fr5l6gTrloURWYEC2L6QkFiIUAWSAeNEBERI259muZlOkVPTXXlvXWekJGeS00RLYDIIkpBSOzo15opJHc+MR3bOeTn6hK2WiV37eWYP2vHeVuUQrXzlTT1WN/LvBqoxLji6HFVQtzOvvLPZAH7/MftYRUlYEoXJzNg2BGDz3AlEJujTM8jRfm5+t8yboeMxx7FsKgWnkN40HNkJuvmkKhEEjrQaZJD2VDlE3GWF8XB0KkGaQa49y+240lAdjh27N1k18zydV/IjiLqpYGdZumVTmF7XSdS9kWhiZUA3eK+DiV3R2oFOOhsa68sArFDOVoXOzFSo3+eMVj+JOZ3sQuawnMg1aCb272sbhrdYbyTSHfXXCtXxBuU/3QowxLW1EnbIsaXubDBF/oG+EIXCCfMCbebnVRIt8/S8XNYYdVb082mmukkNrX89XRaN6Q5EZWwulN8QmzYR4LLyUUG7izLW9W2yxMnfbmXALqrXL6vx5oDbzrtfXZj4Adc81IQGCQmYIgFXwtJaaU8Dl0aWl3eNaakxP5WKiDSWCrO1lL4U6l7ynUfQVNFMIadHR3V/1BtV1r4Kei6f7wCfOsfV1R1tvSFgGbUfWhjhtBm1TDNox0vthsEpe+V9yNAALe3PIm8s2V8ORZ2pX2YBPVmCAzd9i7SzpTVaGKDbaejzKPajGHEQAZHxWhjUAzGC+yCQoZ8EfkziiIJWCAfB/DUVGFKqmR8nLAzxHxbvgIT3KvDCST9KBRZVlV2IvOdw9ZDye9DvV9AXs/p2tH24bSokjr1tiqkc7FaBZi++QM8p8gKq8z3TPqQ0PxwDW4l6BwVbZ1+VN7WNfn0oqgfV8OfUek9Vfh63LtB04CsGhIRBQhPMx0RTvjYf+zSUEeNhTLivFZCELcjHCyb9KPkYz+BqYI/SPQ21yYoWVi81MS+RdmmGfvlHqGUavYBUvdzYz3ucejOT682NWO5UssueWD4wGT+tOntKt0tB6MJHEKG09AkjLIx8QXTS3lqttKtwsh42xiCle1trIRVjKdAgwoyucY+dSLaWZDYU/QXbdIgTroOIEZrEnAgqKQnWntX+51n95z3Xz3su35pyj9m4d1723pVD6C3OxbfFedKbEkwSvX5VNqMF5WADixxUmRkMwWTuwucDpObp7XSa9QeOzZnC+froos1+T1ZpFojgONsnFNs4xhXClJWLzd0POq0rtymv/nzyeVQ07OvwcotlW0ETmUSS+iHX9tCiIqyiD7icJEpzmYR4FKIs4JzSMBRrC97e8X4yu59jvRPAJYVBuyAWij7sE/PrxNgU93vKpuvE3TYURaWfb2e7Wpn2qphCwv0gZpEkMZdKcALrL2yXhoYKGOOK4XZS+UxSymRMdw+NR7AA7qRR7frPAm0evsNl9RcMt8OmWnSQeunuXKlM606giYgI+HFCIiShImhfrXdzJ5WSJj5P4kBCorj0Y31/a3/3xieJfAIqSGPOQTEuKNNOgDs3PgsndfaBh+swOBwf9OG3hdsU/2lP1KNG5pl6dXPmM2VvUA5XyHq9bzgv35W7PT3tEbmPoV8L5phHYRCEWod4/JVM8aR9zdkNzBEJBA04lUQpzqKIKD9+zty06cb9ZXl3K0VaN4ZpEksSqUTHIDQjEW7E9mb4n9G2cbTRkIgoTLFkEykjEkOY7BptLuAWvXKXjalHQsGJKGDBaze6WmB109PvZS/e7qdlnmOC0mTTe4AVC+wPzq7fxyeT/wAVHb87+yYAAA==&quot;"/>
+    <we:property name="isFiltersActionButtonVisible" value="true"/>
+    <we:property name="isVisualContainerHeaderHidden" value="false"/>
+    <we:property name="pageDisplayName" value="&quot;Questions Answered&quot;"/>
+    <we:property name="pageName" value="&quot;ReportSectione605358c5922f8f096d7&quot;"/>
+    <we:property name="pptInsertionSessionID" value="&quot;E80A8102-2D23-4D32-9236-2AF6E191FD70&quot;"/>
+    <we:property name="reportEmbeddedTime" value="&quot;2024-03-09T02:34:44.140Z&quot;"/>
+    <we:property name="reportName" value="&quot;NHS NECSU&quot;"/>
+    <we:property name="reportState" value="&quot;CONNECTED&quot;"/>
+    <we:property name="reportUrl" value="&quot;/groups/me/reports/2f39f5dc-b270-48fd-90fd-e32fa9530203/ReportSectione605358c5922f8f096d7?bookmarkGuid=461c620e-385b-4661-a85c-d3b1fb7e7cbe&amp;bookmarkUsage=1&amp;ctid=283ffb50-a30b-488c-90f4-cdae4f7ae6d1&amp;fromEntryPoint=export&quot;"/>
+  </we:properties>
+  <we:bindings/>
+  <we:snapshot xmlns:r="http://schemas.openxmlformats.org/officeDocument/2006/relationships"/>
+</we:webextension>
+</file>
+
+<file path=ppt/webextensions/webextension4.xml><?xml version="1.0" encoding="utf-8"?>
+<we:webextension xmlns:we="http://schemas.microsoft.com/office/webextensions/webextension/2010/11" id="{9AE639AF-85FA-410F-ACE0-EB9498DBA8A8}">
+  <we:reference id="wa200003233" version="2.0.0.3" store="en-US" storeType="OMEX"/>
+  <we:alternateReferences>
+    <we:reference id="WA200003233" version="2.0.0.3" store="WA200003233" storeType="OMEX"/>
+  </we:alternateReferences>
+  <we:properties>
+    <we:property name="pptInsertionSessionID" value="&quot;DB996B06-8133-4719-95CB-54381B0371CD&quot;"/>
+    <we:property name="reportUrl" value="&quot;/groups/me/reports/63f8b361-5823-4ed2-86cd-023a9d331921/ReportSectione605358c5922f8f096d7?bookmarkGuid=a1a64469-8c1d-47bb-806c-2afe58e00103&amp;bookmarkUsage=1&amp;ctid=5bd29425-66cf-41af-9e85-d00363dee683&amp;fromEntryPoint=export&quot;"/>
+    <we:property name="reportName" value="&quot;NHS NECSU&quot;"/>
+    <we:property name="reportState" value="&quot;CONNECTED&quot;"/>
+    <we:property name="embedUrl" value="&quot;/reportEmbed?reportId=63f8b361-5823-4ed2-86cd-023a9d331921&amp;config=eyJjbHVzdGVyVXJsIjoiaHR0cHM6Ly9XQUJJLVVLLVNPVVRILUItUFJJTUFSWS1yZWRpcmVjdC5hbmFseXNpcy53aW5kb3dzLm5ldCIsImVtYmVkRmVhdHVyZXMiOnsidXNhZ2VNZXRyaWNzVk5leHQiOnRydWV9fQ%3D%3D&amp;disableSensitivityBanner=true&quot;"/>
+    <we:property name="pageName" value="&quot;ReportSectione605358c5922f8f096d7&quot;"/>
+    <we:property name="pageDisplayName" value="&quot;Questions Answered&quot;"/>
+    <we:property name="datasetId" value="&quot;bdc5bdd0-9d5f-40dd-8e48-e5bc76ac928e&quot;"/>
+    <we:property name="backgroundColor" value="&quot;#FFFFFF&quot;"/>
+    <we:property name="bookmark" value="&quot;H4sIAAAAAAAAA+1aW3PbthL+Kx2+9EXTwYUAybzFTtKcmZ7WjXPShzMZDS5LiS1FqiToRvXov3dBSnEsS6Ik25KmiV8skMDi2/suwNvAZvU0V7Of1QSCF8FFWf4xUdUf39FgEBTds5CymFFKIAYuheUQgcK35dRlZVEHL24Dp6oRuA9Z3ajcE8KH//84CFSeX6mRH6Uqr2EQTKGqy0Ll2d/QTcZXrmpgPgjg0zQvK+VJXjvlwJO9wek4Rgj0B447KuOyG7gG47qn72BaVm4xBkkEF7ERCWNpnJJE2gjX1N3bFmb/fL9pC+yyLJzKCgTgn4WExEqFhmsBQhLFidL+eZrlbjFFLyR4G7xpH0ZGS6ElS6wGoTlPQsb824VMt0waBG429XPel9OfcdRt4td+WMqDDYI3VTlBKd8GC8XVjf6zgWqGC15/mlZQdzNvg+vlC/z96/LHNkpet68Ll7mZHyjA4fsWEJmjTq8hR/m18y/LvJm0e6zsWDaVgXeQ3g1asnNU81VVohG0pM04g3RoygmaX1a4AN8uEKQZ5Dbwu/1SWaguZu12r7JqqXm2yuR/QdVNBQdjuSybwg0vW0SXd4jmHgOqIXjB535FJwc2H+worN/G4EG1sips5hag/rMitPpZxNliVzqHzUQ+G83c/33s3PCLrXeCdI/9XlCDYFz+dVkBurj1UsIHeuaptzJYWP5Le6MKgxNWAe2m522INml6FZcXRp0Vo3wRqe5CQ6ffwJZF4y7HqnI+Furf0TZ9IMBl5ZMa7SHMeNV3wRIn//5FBLxE9kZlNdvd4PbT7sfWTSiXVoaWMJ4QLgzh0ihPa6s8HXxyuvx0X5iemqCpNkSlsTYYrbWmWpkHwXfVghaMZgZ3enKrHk2H08rL18CwjecHmE+d4+rqHrfBBDCN+h9WOdVyM+02zaB7X9r2NbTM3gY/ZSiAjvYHlTee7PcXqs7M90uHnm+wg3b6HmFnT2l0ZoBqZyGVUUyjGO0gAqLjXjOox2oKD41AhzThNCZxxMAaNAclaE8GhpRZQeNEhCH+w+TNSfggA6+d9LVkYFVV2Y3Kh61dPSb9vhyNKhipZX57vb+77QoS371pigUO8UWCFmefoFcYOYPs/EC0j0nNj7eBvaDes4K9o6/Jm9p7v71Q1aNy+Cm5PlKWX7Xb1tEsp0YAISFPWILxmFgme+MxZaGOhAxjIqk1QBKxJh6vmfS1xGNsxc3Yt9JDC7XLis6szjUwb0C7MUKffwu1iaMzCNWbhX3adurVEterO1htV3JITawfGYyfl50jhduNRti6jyLKWE2JICKMqCI26U6ttspVtVgvGueQ0oPSWmkjRAqMRxjRLdbYiRa9JLOJGq0p0yFOpOWRICyJJVFMM8J7e7V/eVT/ds717ZyLelEeMRoP35fDt+UEhutj8U5wXlaZG08A+3o/+glS9/wg32WjcbvNtcH59vVNF3qeLcyvgdDu7O8v/OAXXKFcWbWOsZrPBsc5bcJAOxxVZTM9JKV+bnQ6GPukV7oafJ6Uk2M1L19s2WXQRCeRZjSU1jctJsIs+ojDSWKs1EmIrRATXErGwlD1Jryju9zV8nxODK8AlxQO5YK2UIzgmG7XB2NX1ztSNO2Du68rqsqerrLdzkx3VMwgkZTHItIkltooSaD/wHajaxguhDQCy0lDhWZM6Jgd7hpPIAGspJHt+n8Fyjx8i8vq39DdLppqXSN17urcykynTmCJigjQOCERkjARdLfWh6mTac0SKpOYa0iM1DS2D0v7+yc+SUQJGJ7GUoIRUjFhWwD3TnzWThocwx4+u8HF7OUIflybYunzdtTTRueZ+e6u53PlcFxOtmD9XLq8L9+Wh109HdFyn4K/zphjGYWch9aG2P5qYWTS3eYcZswR4YpxyTQxRoooIobGp4xNuxbu56XdvRjp1BimSaxJZBIbg7KCRFiIHU3w37xtZ29jIVFRmGLKJlpHJIYwOdzbQhWCVJGxwvIQPY/KEHqVfr491XNd3b/CFbb8qzjq7f39Bmmw/BzwDnMwzqyFtqpAu4hCTVOuSHu8xzklOjqtJtOswNiQqXw4A1WdkzrvfYnhP0TMl37+gFztUDruukW5PHjcSrz9nvKYZvJAzP22wmKaKoPxg0Q6BmFUGIvT2orLMB9lxVCpYu2F99fl+avS6NcogIxjjW0dlZjCBTHk1Brd9Vrs69Ls5iukPg3zVCQ2siHWx5xhya2j6MSZ+i7wTMrCjc/ue7uTKHiDUPr1mwBPmQQFcUg15RxsQg4vvx9ffDgHhfXEh+bQfudfpdg1AulTaqvXdbyXjaunysCVKmCNDJB3H/jtXpXGfP4PvJbuwjEyAAA=&quot;"/>
+    <we:property name="initialStateBookmark" value="&quot;H4sIAAAAAAAAA+1bS3PbNhD+Kx1eetF08CBAMjfbSZpOm8SN0/TQyWjwWEpsKVIlITeqR/+9C1KKY1kSJdmWNE1ysfBa7PNbLMDcBDarx7mavlEjCJ4F52X510hVf31Hg15QzPvevv359dm7n/tvzl6/wO5y7LKyqINnN4FT1QDch6yeqNxTwM4/PvYCleeXauBbqcpr6AVjqOqyUHn2L7STcchVE5j1Avg0zstKeZJXTjnwZK9xOrZxb/oDxx2Vcdk1XIFxbe87GJeVm7dBEsFFbETCWBqnJJE2wjV1O9qw2T3fb9owdlEWTmUFMuD7QkJipULDtQAhieJEad+fZrmbT9Fz1d0EL5vOyGgptGSJ1SA050nImB+dK3PDpF7gpmM/5305foOtdhO/9sNCH6wXvKzKEWr5JphbrJ7ovydQTXHBi0/jCup25k1wtRjA378ufmyipDyJwmVu6hsKsPm+YYjM0KZXkKP+mvkXZT4ZNXss7VhOKgPvIL1tNGRnaObLqkQnaEibYQZp35Qj9LuscAGOzjlIM8ht4Hd7W1mozqfNds+zamF5tizka1D1pIK9ebkoJ4XrXzQcXdxyNPM8oBmCZ3zmV7R6YLPelsr6fQieqUZXhc3cnKmflpRWP4k6G96VzmE9kc9OM/P/PrZh+MXWW7F0R/xOpnrBsPznogIMceu1hB166qk3Oph7/pm9VoXBCcsMbWfnTRyts/QyX14ZdVYM8jlS3UJDa9/AlsXEXQxV5TwW6j/RNz0Q4LLyUZ12H2G86VuwxMl/foGAFyjeoKym2zvcbtb92IQJ5dLK0BLGE8KFIVwa5Wlt1KeDT06Xn+4q01MTNNWGqDTWBtFaa6qVuQe+yx40FzQzuNOje/Vg3B9XXr8G+g2e7+E+dY6rqzvSBiPANOp/WOVUI8243TSDdry0zTA0wt4Ev2SogJb2B5VPPNnvz1Wdme8XAT1b4wfN9B1gZ0dttG6AZmchlVFMoxj9IAKi4043qIdqDPedQIc04TQmccTAGnQHJWhHBoaUWUHjRIQh/sHkzUl4LwOvnPS1ZGBVVdm1yvuNXz0k/Z4NBhUM1CK/vdg93LZlEsdeToo5H+KLBC1OPkEvCXIC2fmeah+Smh/uAzuxescLdkZfk09qH/32XFUPyuHHlPpAWX7Zb5tAs5waAYSEPGEJ4jGxTHbiMWWhjoQMYyKpNUASsQKPV0z6WvAYa3Az9KV030LtsqJ1q1MF5jXcrkXo0y+h1kl0AlC9XtnHLaeeL/h6fstWU5XscybWDwTjpxXnQHC71gmb8FFEGaspEUSEEVXEJu2t1Ua9qobX84lzSOne0VppI0QKjEeI6BbP2IkWnSSzkRqsOKZDnEjLI0FYEkuimGaEd9Zq/3NU/3bP9e2ei3pVHhCN++/L/qtyBP3VWLwVO2dV5oYjwLret36B1D09k++ywbDZ5srgfPviuoWeJ4P5FSw0O/v3C994iyuUK6smMJbzWe8wt00ItP1BVU7G+6TUz4VOy8Yu6ZUug8+jSnKo4uWLLdsMmugk0oyG0vqixUSYRR9wOUmMlToJsRRigkvJWBiqzoR38JC7XNzPif4l4JLCoV7QF4oBHDLsutjYNvQOhKZd7O4aiqqyxzvZbhamvSpmkEjKYxFpEkttlCTQfWG7NjQMF0IagcdJQ4VmTOiY7R8aj6ABPEmj2PVvBeo8fIXL6t8x3M4n1apC6tTNuVGY1pzAEhURoHFCIiRhImhfrfczJ9OaJVQmMdeQGKlpbO8f7e/e+CQRJWB4GksJRkjFhG0YuHPjs3JS7xD+8DkMzqdnA/hxZYqlT1tRjyc6z8x3tzWfK/vDcrSB189Hl/flq3K/p6cDeu5jyNc6cyyjkPPQ2hDLXy2MTNrXnP2cOSJcMS6ZJsZIEUXE0PiY2LTtwf20rLuTIK0ZwzSJNYlMYmNQVpAID2IHU/y3aNs62lhIVBSmmLKJ1hGJIUz2j7ZQhSBVZKywPMTIozKETqOfbk31VE/3z3GFLf8pDvp6f7dA6i2+A7zlORhm1kJzqkC/iEJNU65Ic73HOSU6Oq4l06xAbMhU3p+Cqk7JnHe+xPAfIuaLOL9HrnaoHXfVcLm4eNxIvPme8pBuck/N3b7CYpoqg/hBIh2DMCqMxXF9xWWYj7Kir1Sx8sH764r8ZW10WxRAxrHGso5KTOGCGHJsi277LPZ1WXb9E1KXhXkqEhvZEM/HnOGRW0fRkTP1LfCMysINT+57u6MYeI1Suu2bAE+ZBAVxSDXlHGxC9j9+P/zw4RwU1hPvm33rnf+VYVcopMuojV1XyV5OXD1WBi5VASt0gLJ74LcdevD/PaP1HdR6Nn9l22J+e90++w93hOw0WTIAAA==&quot;"/>
+    <we:property name="isFiltersActionButtonVisible" value="true"/>
+    <we:property name="isVisualContainerHeaderHidden" value="false"/>
+    <we:property name="reportEmbeddedTime" value="&quot;2024-06-04T00:24:47.483Z&quot;"/>
+    <we:property name="creatorTenantId" value="&quot;5bd29425-66cf-41af-9e85-d00363dee683&quot;"/>
+    <we:property name="creatorUserId" value="&quot;10032002B7893BC0&quot;"/>
+    <we:property name="creatorSessionId" value="&quot;33e6c334-e410-4e90-9c13-84b0a274deb1&quot;"/>
+    <we:property name="artifactViewState" value="&quot;live&quot;"/>
+  </we:properties>
+  <we:bindings/>
+  <we:snapshot xmlns:r="http://schemas.openxmlformats.org/officeDocument/2006/relationships"/>
+</we:webextension>
+</file>
+
+<file path=ppt/webextensions/webextension5.xml><?xml version="1.0" encoding="utf-8"?>
 <we:webextension xmlns:we="http://schemas.microsoft.com/office/webextensions/webextension/2010/11" id="{BE6D1190-6E13-4ED4-9F8D-D1FC0597DDD3}">
   <we:reference id="wa200003233" version="2.0.0.3" store="en-US" storeType="OMEX"/>
   <we:alternateReferences>
     <we:reference id="WA200003233" version="2.0.0.3" store="WA200003233" storeType="OMEX"/>
   </we:alternateReferences>
   <we:properties>
+    <we:property name="artifactViewState" value="&quot;live&quot;"/>
+    <we:property name="backgroundColor" value="&quot;#FFFFFF&quot;"/>
+    <we:property name="bookmark" value="&quot;H4sIAAAAAAAAA52TTWsbMRCG/0rR2RR9rrQ5ttdSQlNyCTmMpFlXjbxaduXg1Pi/d7Q2hNIWgy+7mlej550ZmCOLaZkyvH2FHbI79qmUlx3MLx8E27DxT02H4PQQgwaJwvuovAPKKlNNZVzY3ZFVmLdYH9Oyh9yAJD49bxjkfA/bFg2QF9ywCeeljJDTLzwn01Wd93jaMDxMuczQkA8VKjbsK6VTTKWIj4ocIdT0ig8Y6ln9hlOZ6yWOIB0qwb3ySiuwvJOW3izn27XM6/nNdC3scxkrpJEKaBpEzt0QB2OFlwI4j65v+pLGbb608v72+9vUxlfxUH05tEn5n+TZSKcTtTpojjIII9FJZ0SIXvirtLSjSf7NEmiDdEoarz1o7mRn4+2VKW10B84HK5VTSCchr9KWHzD9ozIuggACcYEI3NrI9fUu/8MaIoq+M7oXvBcSDe/DzSzvpJVO9EIbq1QHOnT8VpYJ0UmDXEtpafDSGq5vY624d4XtkDaqHcq+LhMEvIeR4qcjm+ZCa1QTrnm0NjBGjJfz3P5fUsX5bPwIed881/1jq81z+/wGLcg7x/8DAAA=&quot;"/>
+    <we:property name="creatorSessionId" value="&quot;dd23ead9-fdd4-4c67-a411-e5ab8af2d432&quot;"/>
+    <we:property name="creatorTenantId" value="&quot;283ffb50-a30b-488c-90f4-cdae4f7ae6d1&quot;"/>
+    <we:property name="creatorUserId" value="&quot;100320022002D083&quot;"/>
+    <we:property name="datasetId" value="&quot;78e01efd-c0d3-4334-9fc8-7a2e313f1e28&quot;"/>
+    <we:property name="embedUrl" value="&quot;/reportEmbed?reportId=2f39f5dc-b270-48fd-90fd-e32fa9530203&amp;config=eyJjbHVzdGVyVXJsIjoiaHR0cHM6Ly9XQUJJLU5PUlRILUVVUk9QRS1KLVBSSU1BUlktcmVkaXJlY3QuYW5hbHlzaXMud2luZG93cy5uZXQiLCJlbWJlZEZlYXR1cmVzIjp7InVzYWdlTWV0cmljc1ZOZXh0Ijp0cnVlLCJkaXNhYmxlQW5ndWxhckpTQm9vdHN0cmFwUmVwb3J0RW1iZWQiOnRydWV9fQ%3D%3D&amp;disableSensitivityBanner=true&amp;lrtl=true&quot;"/>
+    <we:property name="initialStateBookmark" value="&quot;H4sIAAAAAAAAA51TTW/bMAz9K4POwaBPS+6tG3bq+oF26KUoCkqiM62KZdhKkS7If5/kBOhhGwzkYpNP5HuPBLgnPkxDhPcb2CC5IF9Set3A+PqJkRXpT9jt7dX15f3Vy83l9bcCpyGH1E/kYk8yjGvMj2HaQqwMBXx6XhGI8Q7WNesgTrgiA45T6iGG33gsLk953OJhRXA3xDRCpXzIkLHSvpXykhdt9lkURXA5vOEDunxE73FIYz7lHrhBwagVVkgBmjZcl57p+DrbXK6vorOxr6nPEPpioGLgKTWd75RmljOg1Ju24lPo1/E0ykfvj/eh7ivjLtu0q5uyv4pmZTocyqidpMgdUxwNN4o5b5ldZAubssm/uRhqx43gykoLkhreaH++MyGVbMBYp7kwAkvE+CLb9BOGfzijzDEoRJQhAtXaU7k85X+4Oo+sbZRsGW0ZR0VbdzaXNVxzw1omlRaiAekaei6Xct5whVRyrsviuVZUnsc1030gZIPlomqQtnkawOEd9CV/2pNhTOWMcsC5rpwN9B79KR7r/3vIOB6FHyFuq+Z8f2QWKV6CjbjQUK+SzLae6+cPdAEIriAEAAA=&quot;"/>
+    <we:property name="isFiltersActionButtonVisible" value="true"/>
+    <we:property name="isVisualContainerHeaderHidden" value="false"/>
+    <we:property name="pageDisplayName" value="&quot;Summary&quot;"/>
+    <we:property name="pageName" value="&quot;ReportSectionda28e310b3b343a70627&quot;"/>
     <we:property name="pptInsertionSessionID" value="&quot;E80A8102-2D23-4D32-9236-2AF6E191FD70&quot;"/>
+    <we:property name="reportEmbeddedTime" value="&quot;2024-03-09T02:36:02.748Z&quot;"/>
+    <we:property name="reportName" value="&quot;NHS NECSU&quot;"/>
+    <we:property name="reportState" value="&quot;CONNECTED&quot;"/>
     <we:property name="reportUrl" value="&quot;/groups/me/reports/2f39f5dc-b270-48fd-90fd-e32fa9530203/ReportSectionda28e310b3b343a70627?bookmarkGuid=791f0f30-e899-40dd-b77d-6554e749dfdf&amp;bookmarkUsage=1&amp;ctid=283ffb50-a30b-488c-90f4-cdae4f7ae6d1&amp;fromEntryPoint=export&quot;"/>
+  </we:properties>
+  <we:bindings/>
+  <we:snapshot xmlns:r="http://schemas.openxmlformats.org/officeDocument/2006/relationships"/>
+</we:webextension>
+</file>
+
+<file path=ppt/webextensions/webextension6.xml><?xml version="1.0" encoding="utf-8"?>
+<we:webextension xmlns:we="http://schemas.microsoft.com/office/webextensions/webextension/2010/11" id="{F9D86981-1EB7-47EA-8BEA-3876F4C9CA89}">
+  <we:reference id="wa200003233" version="2.0.0.3" store="en-US" storeType="OMEX"/>
+  <we:alternateReferences>
+    <we:reference id="WA200003233" version="2.0.0.3" store="WA200003233" storeType="OMEX"/>
+  </we:alternateReferences>
+  <we:properties>
+    <we:property name="pptInsertionSessionID" value="&quot;DB996B06-8133-4719-95CB-54381B0371CD&quot;"/>
+    <we:property name="reportUrl" value="&quot;/groups/me/reports/63f8b361-5823-4ed2-86cd-023a9d331921/ReportSectionda28e310b3b343a70627?bookmarkGuid=5a25288c-2a8e-4617-8c4b-f70a7a6e53de&amp;bookmarkUsage=1&amp;ctid=5bd29425-66cf-41af-9e85-d00363dee683&amp;fromEntryPoint=export&quot;"/>
+    <we:property name="reportName" value="&quot;NHS NECSU&quot;"/>
+    <we:property name="reportState" value="&quot;CONNECTED&quot;"/>
+    <we:property name="embedUrl" value="&quot;/reportEmbed?reportId=63f8b361-5823-4ed2-86cd-023a9d331921&amp;config=eyJjbHVzdGVyVXJsIjoiaHR0cHM6Ly9XQUJJLVVLLVNPVVRILUItUFJJTUFSWS1yZWRpcmVjdC5hbmFseXNpcy53aW5kb3dzLm5ldCIsImVtYmVkRmVhdHVyZXMiOnsidXNhZ2VNZXRyaWNzVk5leHQiOnRydWV9fQ%3D%3D&amp;disableSensitivityBanner=true&quot;"/>
+    <we:property name="pageName" value="&quot;ReportSectionda28e310b3b343a70627&quot;"/>
+    <we:property name="pageDisplayName" value="&quot;Summary&quot;"/>
+    <we:property name="datasetId" value="&quot;bdc5bdd0-9d5f-40dd-8e48-e5bc76ac928e&quot;"/>
+    <we:property name="backgroundColor" value="&quot;#FFFFFF&quot;"/>
+    <we:property name="bookmark" value="&quot;H4sIAAAAAAAAA52TTW/bMAyG/8qgczBI1Kd77K7DUKxDL0UPlERnWh3LsJUiXZD/PskJ0MM2BMjF5peelyTAI4tpmQZ8/4Y7YnfsPufXHc6vnwTbsPEc86C5MbaXCDpCh8GYULN5KimPC7s7soLzlspTWvY4NFANPr9sGA7DA26b1+Ow0IZNNC95xCH9pnNxTZV5T6cNo8M05Bkb8rFgoYZ9q+XVry2Iz7IqYijpjR4plHP0O015Lhc/IjiSgnvppZJouQFb3yzn7Nrm9fomujb2JY8F01gbaDGMnLs+9toKDwI5j65r8SWN2+EyysfbH+9TW1uhQ/H50Dblf1XNRjqd6qi94gRBaCAHTosQvfBXaWlXN/k3S5AN4CRorzwq7sDYeHtnUmll0PlgQTpJ1RJwlbb8xOkfnXERBFYQF0TIrY1cXZ/yP6w+kuiMVp3gnQDSvAs3s7wDC050QmkrpUEVDL+VpUN0oIkrAFsXD1ZzdRtrxX1E2I7qRTUj78syYaAHHKv/fGTTnOsZlURrXT0bHCPFiz23/9dUaD4LP+Gwb5rr/bFV5qV9/gAPJp3X9wMAAA==&quot;"/>
+    <we:property name="initialStateBookmark" value="&quot;H4sIAAAAAAAAA52TS2/bMAzHv8qgczDoacm9dcNOXR9oh16KYqAkJtPqWIatFOmCfPdRToAetiFDLhb5F/Xjw+COxTQNHbzdwBrZBfuU88saxpcPgi1Yf9Rub6+uL++vvt9cXn8hOQ8l5X5iFztWYFxheUzTBrpKIPHpecGg6+5gVb0ldBMu2IDjlHvo0i88BNNVGTe4XzDcDl0eoSIfChSs2FcKJ59yi4+KMkIo6RUfMJSDeo9DHsvRjyAdKsG98korsLyRlt5Mh9u5zNPxNelc2OfcF0g9FVA1iJy7ZVwaK7wUwHl0bdWn1K+6Yyvvb7+9DXVeBbfF522dlP9JOStpv6dWl5qjDMJIdNIZEaIX/iQtrWmSf7IE2iCdksZrD5o72dh4fmVKG92A88FK5RSSJeRJ2vQDhr9UxkUQQCAuEIFbG7k+3eU/WMuIom2MbgVvhUTD23A2yztppROt0MYq1YAODT+XZUJ00iDXUloavLSG6/NYM+5dYWukjapG3pRpgIB30JP/tGPDmGmNSsI5jtYG+ojxaI/1/JoKjofEj9Bt5j9OS8bmHFRK8h3+Z/x+/1w/vwHcGNq1HwQAAA==&quot;"/>
+    <we:property name="isFiltersActionButtonVisible" value="true"/>
+    <we:property name="isVisualContainerHeaderHidden" value="false"/>
+    <we:property name="reportEmbeddedTime" value="&quot;2024-06-04T00:26:26.059Z&quot;"/>
+    <we:property name="creatorTenantId" value="&quot;5bd29425-66cf-41af-9e85-d00363dee683&quot;"/>
+    <we:property name="creatorUserId" value="&quot;10032002B7893BC0&quot;"/>
+    <we:property name="creatorSessionId" value="&quot;229fe6a1-6f03-476d-b37b-1cf5b7b4e9f0&quot;"/>
+    <we:property name="artifactViewState" value="&quot;live&quot;"/>
+  </we:properties>
+  <we:bindings/>
+  <we:snapshot xmlns:r="http://schemas.openxmlformats.org/officeDocument/2006/relationships"/>
+</we:webextension>
+</file>
+
+<file path=ppt/webextensions/webextension7.xml><?xml version="1.0" encoding="utf-8"?>
+<we:webextension xmlns:we="http://schemas.microsoft.com/office/webextensions/webextension/2010/11" id="{D56A1719-05A6-422A-81B8-87A4373E01FB}">
+  <we:reference id="wa200003233" version="2.0.0.3" store="en-US" storeType="OMEX"/>
+  <we:alternateReferences>
+    <we:reference id="WA200003233" version="2.0.0.3" store="WA200003233" storeType="OMEX"/>
+  </we:alternateReferences>
+  <we:properties>
+    <we:property name="pptInsertionSessionID" value="&quot;563FA86F-08A9-468E-8003-14C313519678&quot;"/>
+    <we:property name="reportUrl" value="&quot;/groups/93b96c56-7160-4c25-b955-19f8c698bb55/reports/2f39f5dc-b270-48fd-90fd-e32fa9530203/ReportSection?bookmarkGuid=c83d59d2-a0f1-4eb8-ae02-062f103a6ec0&amp;bookmarkUsage=1&amp;ctid=283ffb50-a30b-488c-90f4-cdae4f7ae6d1&amp;fromEntryPoint=export&quot;"/>
     <we:property name="reportName" value="&quot;NHS NECSU&quot;"/>
     <we:property name="reportState" value="&quot;CONNECTED&quot;"/>
     <we:property name="embedUrl" value="&quot;/reportEmbed?reportId=2f39f5dc-b270-48fd-90fd-e32fa9530203&amp;config=eyJjbHVzdGVyVXJsIjoiaHR0cHM6Ly9XQUJJLU5PUlRILUVVUk9QRS1KLVBSSU1BUlktcmVkaXJlY3QuYW5hbHlzaXMud2luZG93cy5uZXQiLCJlbWJlZEZlYXR1cmVzIjp7InVzYWdlTWV0cmljc1ZOZXh0Ijp0cnVlLCJkaXNhYmxlQW5ndWxhckpTQm9vdHN0cmFwUmVwb3J0RW1iZWQiOnRydWV9fQ%3D%3D&amp;disableSensitivityBanner=true&amp;lrtl=true&quot;"/>
-    <we:property name="pageName" value="&quot;ReportSectionda28e310b3b343a70627&quot;"/>
-    <we:property name="pageDisplayName" value="&quot;Summary&quot;"/>
+    <we:property name="pageName" value="&quot;ReportSection&quot;"/>
+    <we:property name="pageDisplayName" value="&quot;Descriptive&quot;"/>
     <we:property name="datasetId" value="&quot;78e01efd-c0d3-4334-9fc8-7a2e313f1e28&quot;"/>
     <we:property name="backgroundColor" value="&quot;#FFFFFF&quot;"/>
-    <we:property name="bookmark" value="&quot;H4sIAAAAAAAAA52TTWsbMRCG/0rR2RR9rrQ5ttdSQlNyCTmMpFlXjbxaduXg1Pi/d7Q2hNIWgy+7mlej550ZmCOLaZkyvH2FHbI79qmUlx3MLx8E27DxT02H4PQQgwaJwvuovAPKKlNNZVzY3ZFVmLdYH9Oyh9yAJD49bxjkfA/bFg2QF9ywCeeljJDTLzwn01Wd93jaMDxMuczQkA8VKjbsK6VTTKWIj4ocIdT0ig8Y6ln9hlOZ6yWOIB0qwb3ySiuwvJOW3izn27XM6/nNdC3scxkrpJEKaBpEzt0QB2OFlwI4j65v+pLGbb608v72+9vUxlfxUH05tEn5n+TZSKcTtTpojjIII9FJZ0SIXvirtLSjSf7NEmiDdEoarz1o7mRn4+2VKW10B84HK5VTSCchr9KWHzD9ozIuggACcYEI3NrI9fUu/8MaIoq+M7oXvBcSDe/DzSzvpJVO9EIbq1QHOnT8VpYJ0UmDXEtpafDSGq5vY624d4XtkDaqHcq+LhMEvIeR4qcjm+ZCa1QTrnm0NjBGjJfz3P5fUsX5bPwIed881/1jq81z+/wGLcg7x/8DAAA=&quot;"/>
-    <we:property name="initialStateBookmark" value="&quot;H4sIAAAAAAAAA51TTW/bMAz9K4POwaBPS+6tG3bq+oF26KUoCkqiM62KZdhKkS7If5/kBOhhGwzkYpNP5HuPBLgnPkxDhPcb2CC5IF9Set3A+PqJkRXpT9jt7dX15f3Vy83l9bcCpyGH1E/kYk8yjGvMj2HaQqwMBXx6XhGI8Q7WNesgTrgiA45T6iGG33gsLk953OJhRXA3xDRCpXzIkLHSvpXykhdt9lkURXA5vOEDunxE73FIYz7lHrhBwagVVkgBmjZcl57p+DrbXK6vorOxr6nPEPpioGLgKTWd75RmljOg1Ju24lPo1/E0ykfvj/eh7ivjLtu0q5uyv4pmZTocyqidpMgdUxwNN4o5b5ldZAubssm/uRhqx43gykoLkhreaH++MyGVbMBYp7kwAkvE+CLb9BOGfzijzDEoRJQhAtXaU7k85X+4Oo+sbZRsGW0ZR0VbdzaXNVxzw1omlRaiAekaei6Xct5whVRyrsviuVZUnsc1030gZIPlomqQtnkawOEd9CV/2pNhTOWMcsC5rpwN9B79KR7r/3vIOB6FHyFuq+Z8f2QWKV6CjbjQUK+SzLae6+cPdAEIriAEAAA=&quot;"/>
+    <we:property name="bookmark" value="&quot;H4sIAAAAAAAAA+VabW/bOBL+Kwd96R1gLMR3sd+adPdu77ZF0RT75RAEQ3JoaytLhiR3my38328o2c06seu9JI3T5oNhi6SG8/Jw+AzpT1kou0UFl69hjtnz7KRp3s+hff83lk2yervNKhvz4MGD9swgRC0ljWoWfdnUXfb8U9ZDO8X+17JbQpUEUuN/zycZVNUbmKanCFWHk2yBbdfUUJV/4DiYuvp2iatJhh8XVdNCEnnWQ49J7AcaTs+kCvtB0Izg+/IDnqHvx9a3uGjafvM8ybrx16DSdl8SNkx42tQ9lDUJTm1MSYjRYIQCc5BCIVepvSvrabVW8erdd5eL5JYeP/au+Zg84H4j+UnSakUmxBi5YIoxyZy2kJucm/R2LKt+PaG7/PHjoiXvkM9GaS/CB6g9hmxwQYtdt9b3FUK3bAc//LjVcdYsW49vMQ5ddV/2lyQHALOkxJu2IS8PTb5Z1v275l/NfOyaNb+ftki+DdnzfHVOLV+000Mbto2khzZge3I5GPCybDfe5ZNrOt638qQtdRfOgg3oZeE0l2iYDPz24RLMalmoQgGTkRXeSGTHDNeLKf6zbZaLl2XXl7XvT5MHvr3A7TNjDKHjIi947nSuBcNAK0W6O4QwgrVS6CLkWnqfW1Pkxwzhu6aH6uINZTGsSctvLnY39B+DxjgaLbDQuWfOKHJ6EQ8GrZsBfd9MkrkoeEClDXAPhZYcxO0BYJXGaCWzgscEKoYobw+AF9Npi1PY7BjbTjxtquV8R/tfdu50cbFo0xbm8WLYYVP/T8t6E84HRsuxjR2hBSkBCKMgFEEox1BrvT+Aa2Ly09BJQMqdjN552hE8Og4+kZd1kN81i9c3Anxns4jNXExTdtuxtifHBti2clfOVrdAVkUciXiYf49h1Ou0mbvmdAZt/xcBx64D7l7tW51v6CAN+O1PvO+UTJw27ajOvU55PmQcH0QUVlirPFFiCMK6wyRvrVTpydP3jslY1oS2khL3nMjt7Gq5PTZ49j3WIc184T9Tm+8PpXvC8UCA3TP7kGtn5XRW0acf9lusNj6geQP08AoWqYOE/rBLChsGdp6m+jmMnpovoC27jd82T/8p6xS9SfYLxv7rIvztxppfSlp8I0B+hWqZsPHs38vqWXL8asDRHHtIVpIV2UBJXzf162VV/T3Zex2a/8jOU7zGNX2l9KvPMj79aeV0XzdylHLAzzAMdv3c43ycrwyYhJXYfcNxmWQfUusaeUTdM+r8nGq5iwaEcMZJAMOtCHCY3X/VVNuXc7wo6wuAOjzKHHtTwbslWF8tO/I1hhNo/5+0+sBs84DZD5R7r2sxotgyVnAuQXGhY9Qggg/HRfFObv7IgHygfviOsXzY8geC8w5FRkQbqQAj5hINSEeFmzKHjwP2lvDM+GAKUAKEL6gcpET/hQrwuKj0sxIjUYT5ooLyBoP9vir4g7auC3jBItcIXniJ3Bst4x3OZJ0OElFBbkBrjoG2/cPSyjmVaTdlBbQBbLAMUGhu81xaPCgLBvtOln0/3ChcEykZY4IVjmlmSJpFGe5weOUUel+EyC16p5TEII68M1wRukuE9jbnl11F6aLdspWodzsdPL/m35+yxTjlQF6pvwm4odT7SOMJdKW/oo3b1cu2uK4n7/Rng5Znw7gDwofLqU2lsNqTW4fB9071125e893CKDCO5YUjys9RFvYOt1FeFAItOOMt5eoYAwp3XHR96fDsaMB6SW+E5vf62UMC4OaxklXKQ+5ZNKiNcCIvxB0yiwaT59Fra5wtfK6l0cWj55xPCwJ72ZXNpec8cNocADHSKtb29kggbgYMvKbSIxZSmuCKIyPhUA39tGCwu2Z0HDlX0gerpPY5F44dpi57MaCYFVqpQotgLQcpxLHPUULZ+Vn6z8hFwHRLPHLYp46FfV4ZMZFbY7SxQUihdC6ioprp9piQjkq4kBeMeS4Cs1h4+1i45xevMZ4WJPYf56+GP7B4pbSn3d1ZRZWOYHB7RDBrBE+ZhjsoIpFF4fEgIvbW4V/ntugpQ2GHQ86H6Ve77WuWfbcAj2+gxh12kn1pywkHbN2ujVar/wHsivwLOCgAAA==&quot;"/>
+    <we:property name="initialStateBookmark" value="&quot;H4sIAAAAAAAAA+VaTW/bOBD9KwtdejEW4jfZW+K2u0C3bdAEvSwCY0gOHbWyZEhym2zh/76U5DSb2I66ThqnzckWKQ1n3jwN39D+mvisnudw8RZmmDxPDsvy0wyqT7+RZJQUq7F3716/OXj/evL24M3LOFzOm6ws6uT516SBaorNh6xeQN5aiIN/n44SyPMjmLZXAfIaR8kcq7osIM/+wf7mONVUC1yOEjyf52UFrcnjBhpszX6Ot8fruDb5ncUVwTXZZzxG1/Sj73FeVs3l9Sip+2+dS9fnWmPdguOyaCArouF2jAgOISgMoDEFzgRS0Y7XWTHNVy5ePXtyMW9xaPC8seV5i4D9GO23lpbLGEIIgTIiCOHESgOpSqlqnw5Z3qwWtBcvz+dVRCdi1ls78J+hcOiTDoIK63rl7xuEelF1OLy8NnFcLiqH7zF0U0WTNRfRDgAmrRNHVRlR7oZcuSiak/LPctZPnZVfxhVGbH3yPF2expFb43RQ+etBxovKY3V40QXwIqsu0aWjGz7et/PR2zitrQHj0XFtJeWoCPd093QxYiTXQgsgPBDtFEeyz3QdTPGPqlzMX2R1kxWuGbcI/HyJ2xZGn0JLWappamUqGUEf3xRu75DCAMZwJrVPJXcuNUqn+0zhSdlAPjmKVQyL6OVPl7s1//ukEYpKMtQydcQqEUHXYTBp9RnEz/UimTJNPQqpgDrQklNguxPACInBcGIYDS2pCCLfnQAH02mFU7jcMa6DOC7zxWzD+HeDO51P5lW7hTmcdFtqO/9qUVym84HZsu9ge2pBWwCYEuC1Z8ISlFJuT+BKibzqJiORUsuDsy7uCA4tBdeqlVWST8r527UE3zmsqGYm07a6bXi3R/sm2HXnrsAWOzArjxop6jD3CX3v17ic2XJ8BlXznYQjNwl3r/EtTy/lYLzh43903ziGOC2r3p17XfK0qzjOs8AMM0Y47wA8M3ZY5K2cylxE+t45GbIisi2LhXsWxe3Z1ev22OjZNFj4duWJ+yZtfj2WbknHAxF2y+o9d6kNChizynIARQ3zMCyXfih3m2yGk6yYABT+UZJ23cG7Mdblizpijf4Qqv/D0wfevgfCfiAy3/SiZ7EhRFPKQVAmQ5DAvPP7ZfFGsfPIiDwgyH5hLg9H/kB03uBIz2jFBWDAlKMCbqMSFmq4v9raExHlvNIgGDCno76Ohf4WSb1fVrqzDEOUA7N5DtmaJPi1WqLBWFcdESOBSgTHHEfqlOThDodcVnqOKCBVICVFH7f9YWvZLOredVsejQfjDQFkkpo05QYHbUEX3+Giaboj2hsmOSGEEW2JJCpaM8j9HU4DrEDntA/UoLNCcPRszzvDlRy7QKh2ORCq81guqmuxJjOsph3yHhroYpn3S2bYz5e+m8Yu1K/JX1kMv7f9AfJFa/bZIdSZe9YK06781ZhfvhZr5uomotMcd14ed/cNGO9O+1emO0pvqq3dzfV9q94VzCu9q5UAZUmqrQNHkWtzh+N9xzRDA1Y5E2t1CB6Z3S+7bjuN2BuxXsQnfPmlePaQBFjv040QDlJHgkKpmGWpZneoLBJUmgYnjbJGu1RyJfWj15xPiwJb1ZVJuaPU07g5AGKIb7E0uzMhajMg4GRsPYLmXHmr98yEoR76adFgc89oKVIquPNGcOlSyiwZli5bOSCIYVIILZk3hgJnbN/nKD6r3Vn7I/zEY/uzW69hnzoXtqHScyI1SkllPONMyJQFEXum3TnBbWzhfKoJcZR5YlA781i0563nwk+LEreejzJinBDSxd3dGhE7HUZgd0YQoxhtKw21oEMUi8zhICO29uE/5vj9KVNhAyCn3fLLzfGVi6aeg8MjKHBDnDG+dsvxA7F+641GLbSZzYfAaf8f9Q2W5fJf3LoEWqolAAA=&quot;"/>
     <we:property name="isFiltersActionButtonVisible" value="true"/>
     <we:property name="isVisualContainerHeaderHidden" value="false"/>
-    <we:property name="reportEmbeddedTime" value="&quot;2024-03-09T02:36:02.748Z&quot;"/>
+    <we:property name="reportEmbeddedTime" value="&quot;2024-03-11T22:13:07.297Z&quot;"/>
     <we:property name="creatorTenantId" value="&quot;283ffb50-a30b-488c-90f4-cdae4f7ae6d1&quot;"/>
     <we:property name="creatorUserId" value="&quot;100320022002D083&quot;"/>
-    <we:property name="creatorSessionId" value="&quot;dd23ead9-fdd4-4c67-a411-e5ab8af2d432&quot;"/>
+    <we:property name="creatorSessionId" value="&quot;72124263-85a0-4af9-a43b-eca494d74e17&quot;"/>
     <we:property name="artifactViewState" value="&quot;live&quot;"/>
   </we:properties>
   <we:bindings/>

</xml_diff>